<commit_message>
updates for slide deck
</commit_message>
<xml_diff>
--- a/reports/Crime Analysis .pptx
+++ b/reports/Crime Analysis .pptx
@@ -5,22 +5,25 @@
     <p:sldMasterId id="2147483648" r:id="rId1"/>
   </p:sldMasterIdLst>
   <p:notesMasterIdLst>
-    <p:notesMasterId r:id="rId12"/>
+    <p:notesMasterId r:id="rId15"/>
   </p:notesMasterIdLst>
   <p:handoutMasterIdLst>
-    <p:handoutMasterId r:id="rId13"/>
+    <p:handoutMasterId r:id="rId16"/>
   </p:handoutMasterIdLst>
   <p:sldIdLst>
     <p:sldId id="256" r:id="rId2"/>
     <p:sldId id="291" r:id="rId3"/>
     <p:sldId id="292" r:id="rId4"/>
-    <p:sldId id="293" r:id="rId5"/>
-    <p:sldId id="295" r:id="rId6"/>
-    <p:sldId id="294" r:id="rId7"/>
-    <p:sldId id="296" r:id="rId8"/>
-    <p:sldId id="278" r:id="rId9"/>
-    <p:sldId id="281" r:id="rId10"/>
-    <p:sldId id="282" r:id="rId11"/>
+    <p:sldId id="297" r:id="rId5"/>
+    <p:sldId id="298" r:id="rId6"/>
+    <p:sldId id="293" r:id="rId7"/>
+    <p:sldId id="299" r:id="rId8"/>
+    <p:sldId id="295" r:id="rId9"/>
+    <p:sldId id="294" r:id="rId10"/>
+    <p:sldId id="296" r:id="rId11"/>
+    <p:sldId id="278" r:id="rId12"/>
+    <p:sldId id="281" r:id="rId13"/>
+    <p:sldId id="282" r:id="rId14"/>
   </p:sldIdLst>
   <p:sldSz cx="12192000" cy="6858000"/>
   <p:notesSz cx="6858000" cy="9144000"/>
@@ -224,7 +227,7 @@
           <a:p>
             <a:fld id="{EF1077DB-935E-4A0A-947A-D283B9F9F452}" type="datetimeFigureOut">
               <a:rPr lang="en-ZA" smtClean="0"/>
-              <a:t>2019/03/28</a:t>
+              <a:t>2019/03/29</a:t>
             </a:fld>
             <a:endParaRPr lang="en-ZA" dirty="0"/>
           </a:p>
@@ -401,7 +404,7 @@
           <a:p>
             <a:fld id="{58881107-E2F0-4FFB-BAD2-D68BB3595516}" type="datetimeFigureOut">
               <a:rPr lang="en-ZA" smtClean="0"/>
-              <a:t>2019/03/28</a:t>
+              <a:t>2019/03/29</a:t>
             </a:fld>
             <a:endParaRPr lang="en-ZA" dirty="0"/>
           </a:p>
@@ -744,6 +747,258 @@
     <p:extLst>
       <p:ext uri="{BB962C8B-B14F-4D97-AF65-F5344CB8AC3E}">
         <p14:creationId xmlns:p14="http://schemas.microsoft.com/office/powerpoint/2010/main" val="927328075"/>
+      </p:ext>
+    </p:extLst>
+  </p:cSld>
+  <p:clrMapOvr>
+    <a:masterClrMapping/>
+  </p:clrMapOvr>
+</p:notes>
+</file>
+
+<file path=ppt/notesSlides/notesSlide2.xml><?xml version="1.0" encoding="utf-8"?>
+<p:notes xmlns:a="http://schemas.openxmlformats.org/drawingml/2006/main" xmlns:r="http://schemas.openxmlformats.org/officeDocument/2006/relationships" xmlns:p="http://schemas.openxmlformats.org/presentationml/2006/main">
+  <p:cSld>
+    <p:spTree>
+      <p:nvGrpSpPr>
+        <p:cNvPr id="1" name=""/>
+        <p:cNvGrpSpPr/>
+        <p:nvPr/>
+      </p:nvGrpSpPr>
+      <p:grpSpPr>
+        <a:xfrm>
+          <a:off x="0" y="0"/>
+          <a:ext cx="0" cy="0"/>
+          <a:chOff x="0" y="0"/>
+          <a:chExt cx="0" cy="0"/>
+        </a:xfrm>
+      </p:grpSpPr>
+      <p:sp>
+        <p:nvSpPr>
+          <p:cNvPr id="2" name="Slide Image Placeholder 1"/>
+          <p:cNvSpPr>
+            <a:spLocks noGrp="1" noRot="1" noChangeAspect="1"/>
+          </p:cNvSpPr>
+          <p:nvPr>
+            <p:ph type="sldImg"/>
+          </p:nvPr>
+        </p:nvSpPr>
+        <p:spPr/>
+      </p:sp>
+      <p:sp>
+        <p:nvSpPr>
+          <p:cNvPr id="3" name="Notes Placeholder 2"/>
+          <p:cNvSpPr>
+            <a:spLocks noGrp="1"/>
+          </p:cNvSpPr>
+          <p:nvPr>
+            <p:ph type="body" idx="1"/>
+          </p:nvPr>
+        </p:nvSpPr>
+        <p:spPr/>
+        <p:txBody>
+          <a:bodyPr/>
+          <a:lstStyle/>
+          <a:p>
+            <a:endParaRPr lang="en-US" dirty="0"/>
+          </a:p>
+        </p:txBody>
+      </p:sp>
+      <p:sp>
+        <p:nvSpPr>
+          <p:cNvPr id="4" name="Slide Number Placeholder 3"/>
+          <p:cNvSpPr>
+            <a:spLocks noGrp="1"/>
+          </p:cNvSpPr>
+          <p:nvPr>
+            <p:ph type="sldNum" sz="quarter" idx="5"/>
+          </p:nvPr>
+        </p:nvSpPr>
+        <p:spPr/>
+        <p:txBody>
+          <a:bodyPr/>
+          <a:lstStyle/>
+          <a:p>
+            <a:fld id="{02818732-FA64-4F57-8EE6-57AA70E1F1E0}" type="slidenum">
+              <a:rPr lang="en-ZA" smtClean="0"/>
+              <a:t>6</a:t>
+            </a:fld>
+            <a:endParaRPr lang="en-ZA" dirty="0"/>
+          </a:p>
+        </p:txBody>
+      </p:sp>
+    </p:spTree>
+    <p:extLst>
+      <p:ext uri="{BB962C8B-B14F-4D97-AF65-F5344CB8AC3E}">
+        <p14:creationId xmlns:p14="http://schemas.microsoft.com/office/powerpoint/2010/main" val="1158573916"/>
+      </p:ext>
+    </p:extLst>
+  </p:cSld>
+  <p:clrMapOvr>
+    <a:masterClrMapping/>
+  </p:clrMapOvr>
+</p:notes>
+</file>
+
+<file path=ppt/notesSlides/notesSlide3.xml><?xml version="1.0" encoding="utf-8"?>
+<p:notes xmlns:a="http://schemas.openxmlformats.org/drawingml/2006/main" xmlns:r="http://schemas.openxmlformats.org/officeDocument/2006/relationships" xmlns:p="http://schemas.openxmlformats.org/presentationml/2006/main">
+  <p:cSld>
+    <p:spTree>
+      <p:nvGrpSpPr>
+        <p:cNvPr id="1" name=""/>
+        <p:cNvGrpSpPr/>
+        <p:nvPr/>
+      </p:nvGrpSpPr>
+      <p:grpSpPr>
+        <a:xfrm>
+          <a:off x="0" y="0"/>
+          <a:ext cx="0" cy="0"/>
+          <a:chOff x="0" y="0"/>
+          <a:chExt cx="0" cy="0"/>
+        </a:xfrm>
+      </p:grpSpPr>
+      <p:sp>
+        <p:nvSpPr>
+          <p:cNvPr id="2" name="Slide Image Placeholder 1"/>
+          <p:cNvSpPr>
+            <a:spLocks noGrp="1" noRot="1" noChangeAspect="1"/>
+          </p:cNvSpPr>
+          <p:nvPr>
+            <p:ph type="sldImg"/>
+          </p:nvPr>
+        </p:nvSpPr>
+        <p:spPr/>
+      </p:sp>
+      <p:sp>
+        <p:nvSpPr>
+          <p:cNvPr id="3" name="Notes Placeholder 2"/>
+          <p:cNvSpPr>
+            <a:spLocks noGrp="1"/>
+          </p:cNvSpPr>
+          <p:nvPr>
+            <p:ph type="body" idx="1"/>
+          </p:nvPr>
+        </p:nvSpPr>
+        <p:spPr/>
+        <p:txBody>
+          <a:bodyPr/>
+          <a:lstStyle/>
+          <a:p>
+            <a:endParaRPr lang="en-US" dirty="0"/>
+          </a:p>
+        </p:txBody>
+      </p:sp>
+      <p:sp>
+        <p:nvSpPr>
+          <p:cNvPr id="4" name="Slide Number Placeholder 3"/>
+          <p:cNvSpPr>
+            <a:spLocks noGrp="1"/>
+          </p:cNvSpPr>
+          <p:nvPr>
+            <p:ph type="sldNum" sz="quarter" idx="5"/>
+          </p:nvPr>
+        </p:nvSpPr>
+        <p:spPr/>
+        <p:txBody>
+          <a:bodyPr/>
+          <a:lstStyle/>
+          <a:p>
+            <a:fld id="{02818732-FA64-4F57-8EE6-57AA70E1F1E0}" type="slidenum">
+              <a:rPr lang="en-ZA" smtClean="0"/>
+              <a:t>7</a:t>
+            </a:fld>
+            <a:endParaRPr lang="en-ZA" dirty="0"/>
+          </a:p>
+        </p:txBody>
+      </p:sp>
+    </p:spTree>
+    <p:extLst>
+      <p:ext uri="{BB962C8B-B14F-4D97-AF65-F5344CB8AC3E}">
+        <p14:creationId xmlns:p14="http://schemas.microsoft.com/office/powerpoint/2010/main" val="1948528590"/>
+      </p:ext>
+    </p:extLst>
+  </p:cSld>
+  <p:clrMapOvr>
+    <a:masterClrMapping/>
+  </p:clrMapOvr>
+</p:notes>
+</file>
+
+<file path=ppt/notesSlides/notesSlide4.xml><?xml version="1.0" encoding="utf-8"?>
+<p:notes xmlns:a="http://schemas.openxmlformats.org/drawingml/2006/main" xmlns:r="http://schemas.openxmlformats.org/officeDocument/2006/relationships" xmlns:p="http://schemas.openxmlformats.org/presentationml/2006/main">
+  <p:cSld>
+    <p:spTree>
+      <p:nvGrpSpPr>
+        <p:cNvPr id="1" name=""/>
+        <p:cNvGrpSpPr/>
+        <p:nvPr/>
+      </p:nvGrpSpPr>
+      <p:grpSpPr>
+        <a:xfrm>
+          <a:off x="0" y="0"/>
+          <a:ext cx="0" cy="0"/>
+          <a:chOff x="0" y="0"/>
+          <a:chExt cx="0" cy="0"/>
+        </a:xfrm>
+      </p:grpSpPr>
+      <p:sp>
+        <p:nvSpPr>
+          <p:cNvPr id="2" name="Slide Image Placeholder 1"/>
+          <p:cNvSpPr>
+            <a:spLocks noGrp="1" noRot="1" noChangeAspect="1"/>
+          </p:cNvSpPr>
+          <p:nvPr>
+            <p:ph type="sldImg"/>
+          </p:nvPr>
+        </p:nvSpPr>
+        <p:spPr/>
+      </p:sp>
+      <p:sp>
+        <p:nvSpPr>
+          <p:cNvPr id="3" name="Notes Placeholder 2"/>
+          <p:cNvSpPr>
+            <a:spLocks noGrp="1"/>
+          </p:cNvSpPr>
+          <p:nvPr>
+            <p:ph type="body" idx="1"/>
+          </p:nvPr>
+        </p:nvSpPr>
+        <p:spPr/>
+        <p:txBody>
+          <a:bodyPr/>
+          <a:lstStyle/>
+          <a:p>
+            <a:endParaRPr lang="en-US" dirty="0"/>
+          </a:p>
+        </p:txBody>
+      </p:sp>
+      <p:sp>
+        <p:nvSpPr>
+          <p:cNvPr id="4" name="Slide Number Placeholder 3"/>
+          <p:cNvSpPr>
+            <a:spLocks noGrp="1"/>
+          </p:cNvSpPr>
+          <p:nvPr>
+            <p:ph type="sldNum" sz="quarter" idx="5"/>
+          </p:nvPr>
+        </p:nvSpPr>
+        <p:spPr/>
+        <p:txBody>
+          <a:bodyPr/>
+          <a:lstStyle/>
+          <a:p>
+            <a:fld id="{02818732-FA64-4F57-8EE6-57AA70E1F1E0}" type="slidenum">
+              <a:rPr lang="en-ZA" smtClean="0"/>
+              <a:t>13</a:t>
+            </a:fld>
+            <a:endParaRPr lang="en-ZA" dirty="0"/>
+          </a:p>
+        </p:txBody>
+      </p:sp>
+    </p:spTree>
+    <p:extLst>
+      <p:ext uri="{BB962C8B-B14F-4D97-AF65-F5344CB8AC3E}">
+        <p14:creationId xmlns:p14="http://schemas.microsoft.com/office/powerpoint/2010/main" val="1525977494"/>
       </p:ext>
     </p:extLst>
   </p:cSld>
@@ -21718,18 +21973,18 @@
       </p:grpSpPr>
       <p:sp>
         <p:nvSpPr>
-          <p:cNvPr id="4" name="Title 3">
-            <a:extLst>
-              <a:ext uri="{FF2B5EF4-FFF2-40B4-BE49-F238E27FC236}">
-                <a16:creationId xmlns:a16="http://schemas.microsoft.com/office/drawing/2014/main" id="{E98DCA46-603B-4178-8707-30E192CE6B8D}"/>
-              </a:ext>
-            </a:extLst>
-          </p:cNvPr>
-          <p:cNvSpPr>
-            <a:spLocks noGrp="1"/>
-          </p:cNvSpPr>
-          <p:nvPr>
-            <p:ph type="title"/>
+          <p:cNvPr id="2" name="Content Placeholder 1">
+            <a:extLst>
+              <a:ext uri="{FF2B5EF4-FFF2-40B4-BE49-F238E27FC236}">
+                <a16:creationId xmlns:a16="http://schemas.microsoft.com/office/drawing/2014/main" id="{73416882-5670-4C40-A366-8D841513824D}"/>
+              </a:ext>
+            </a:extLst>
+          </p:cNvPr>
+          <p:cNvSpPr>
+            <a:spLocks noGrp="1"/>
+          </p:cNvSpPr>
+          <p:nvPr>
+            <p:ph idx="1"/>
           </p:nvPr>
         </p:nvSpPr>
         <p:spPr/>
@@ -21738,18 +21993,33 @@
           <a:lstStyle/>
           <a:p>
             <a:r>
-              <a:rPr lang="en-US" dirty="0"/>
-              <a:t>Citations </a:t>
-            </a:r>
-          </a:p>
-        </p:txBody>
-      </p:sp>
-      <p:sp>
-        <p:nvSpPr>
-          <p:cNvPr id="2" name="Slide Number Placeholder 1">
-            <a:extLst>
-              <a:ext uri="{FF2B5EF4-FFF2-40B4-BE49-F238E27FC236}">
-                <a16:creationId xmlns:a16="http://schemas.microsoft.com/office/drawing/2014/main" id="{B9E2F80A-DEFA-4FAD-BB22-4236BAEB0495}"/>
+              <a:rPr lang="en-US" sz="2400" dirty="0"/>
+              <a:t>Crime</a:t>
+            </a:r>
+          </a:p>
+          <a:p>
+            <a:r>
+              <a:rPr lang="en-US" sz="2400" dirty="0"/>
+              <a:t>Population</a:t>
+            </a:r>
+          </a:p>
+          <a:p>
+            <a:r>
+              <a:rPr lang="en-US" sz="2400" dirty="0"/>
+              <a:t>Median Household Income</a:t>
+            </a:r>
+          </a:p>
+          <a:p>
+            <a:endParaRPr lang="en-US" sz="2400" dirty="0"/>
+          </a:p>
+        </p:txBody>
+      </p:sp>
+      <p:sp>
+        <p:nvSpPr>
+          <p:cNvPr id="3" name="Slide Number Placeholder 2">
+            <a:extLst>
+              <a:ext uri="{FF2B5EF4-FFF2-40B4-BE49-F238E27FC236}">
+                <a16:creationId xmlns:a16="http://schemas.microsoft.com/office/drawing/2014/main" id="{E6E438A9-7A49-4873-87AA-B00C0DE2FD1C}"/>
               </a:ext>
             </a:extLst>
           </p:cNvPr>
@@ -21771,6 +22041,829 @@
               <a:t>10</a:t>
             </a:fld>
             <a:endParaRPr lang="en-ZA" dirty="0"/>
+          </a:p>
+        </p:txBody>
+      </p:sp>
+      <p:sp>
+        <p:nvSpPr>
+          <p:cNvPr id="4" name="Footer Placeholder 3">
+            <a:extLst>
+              <a:ext uri="{FF2B5EF4-FFF2-40B4-BE49-F238E27FC236}">
+                <a16:creationId xmlns:a16="http://schemas.microsoft.com/office/drawing/2014/main" id="{50D6945F-BD17-45B9-989C-DD613DFA6427}"/>
+              </a:ext>
+            </a:extLst>
+          </p:cNvPr>
+          <p:cNvSpPr>
+            <a:spLocks noGrp="1"/>
+          </p:cNvSpPr>
+          <p:nvPr>
+            <p:ph type="ftr" sz="quarter" idx="12"/>
+          </p:nvPr>
+        </p:nvSpPr>
+        <p:spPr/>
+        <p:txBody>
+          <a:bodyPr/>
+          <a:lstStyle/>
+          <a:p>
+            <a:r>
+              <a:rPr lang="en-ZA"/>
+              <a:t>Add a footer</a:t>
+            </a:r>
+            <a:endParaRPr lang="en-ZA" dirty="0"/>
+          </a:p>
+        </p:txBody>
+      </p:sp>
+      <p:sp>
+        <p:nvSpPr>
+          <p:cNvPr id="5" name="Title 4">
+            <a:extLst>
+              <a:ext uri="{FF2B5EF4-FFF2-40B4-BE49-F238E27FC236}">
+                <a16:creationId xmlns:a16="http://schemas.microsoft.com/office/drawing/2014/main" id="{76A3CA81-7A6C-47BC-8D67-926B325F8336}"/>
+              </a:ext>
+            </a:extLst>
+          </p:cNvPr>
+          <p:cNvSpPr>
+            <a:spLocks noGrp="1"/>
+          </p:cNvSpPr>
+          <p:nvPr>
+            <p:ph type="title"/>
+          </p:nvPr>
+        </p:nvSpPr>
+        <p:spPr/>
+        <p:txBody>
+          <a:bodyPr/>
+          <a:lstStyle/>
+          <a:p>
+            <a:r>
+              <a:rPr lang="en-US" dirty="0"/>
+              <a:t>Findings</a:t>
+            </a:r>
+          </a:p>
+        </p:txBody>
+      </p:sp>
+    </p:spTree>
+    <p:extLst>
+      <p:ext uri="{BB962C8B-B14F-4D97-AF65-F5344CB8AC3E}">
+        <p14:creationId xmlns:p14="http://schemas.microsoft.com/office/powerpoint/2010/main" val="3775976197"/>
+      </p:ext>
+    </p:extLst>
+  </p:cSld>
+  <p:clrMapOvr>
+    <a:masterClrMapping/>
+  </p:clrMapOvr>
+</p:sld>
+</file>
+
+<file path=ppt/slides/slide11.xml><?xml version="1.0" encoding="utf-8"?>
+<p:sld xmlns:a="http://schemas.openxmlformats.org/drawingml/2006/main" xmlns:r="http://schemas.openxmlformats.org/officeDocument/2006/relationships" xmlns:p="http://schemas.openxmlformats.org/presentationml/2006/main">
+  <p:cSld>
+    <p:spTree>
+      <p:nvGrpSpPr>
+        <p:cNvPr id="1" name=""/>
+        <p:cNvGrpSpPr/>
+        <p:nvPr/>
+      </p:nvGrpSpPr>
+      <p:grpSpPr>
+        <a:xfrm>
+          <a:off x="0" y="0"/>
+          <a:ext cx="0" cy="0"/>
+          <a:chOff x="0" y="0"/>
+          <a:chExt cx="0" cy="0"/>
+        </a:xfrm>
+      </p:grpSpPr>
+      <p:sp>
+        <p:nvSpPr>
+          <p:cNvPr id="8" name="Text Placeholder 7">
+            <a:extLst>
+              <a:ext uri="{FF2B5EF4-FFF2-40B4-BE49-F238E27FC236}">
+                <a16:creationId xmlns:a16="http://schemas.microsoft.com/office/drawing/2014/main" id="{937AF956-2A90-4422-A3C2-A6109BD133BA}"/>
+              </a:ext>
+            </a:extLst>
+          </p:cNvPr>
+          <p:cNvSpPr>
+            <a:spLocks noGrp="1"/>
+          </p:cNvSpPr>
+          <p:nvPr>
+            <p:ph type="body" sz="quarter" idx="18"/>
+          </p:nvPr>
+        </p:nvSpPr>
+        <p:spPr>
+          <a:xfrm>
+            <a:off x="424800" y="3327399"/>
+            <a:ext cx="5468000" cy="2032001"/>
+          </a:xfrm>
+        </p:spPr>
+        <p:txBody>
+          <a:bodyPr/>
+          <a:lstStyle/>
+          <a:p>
+            <a:r>
+              <a:rPr lang="en-ZA" dirty="0"/>
+              <a:t>Virginia is more compliant with the FBI’s new system than Texas</a:t>
+            </a:r>
+          </a:p>
+          <a:p>
+            <a:r>
+              <a:rPr lang="en-ZA" noProof="1"/>
+              <a:t>One reason crime rates dropped after Ike could be because of increased police presence and enforcement</a:t>
+            </a:r>
+          </a:p>
+          <a:p>
+            <a:endParaRPr lang="en-ZA" noProof="1"/>
+          </a:p>
+        </p:txBody>
+      </p:sp>
+      <p:sp>
+        <p:nvSpPr>
+          <p:cNvPr id="2" name="Title 1">
+            <a:extLst>
+              <a:ext uri="{FF2B5EF4-FFF2-40B4-BE49-F238E27FC236}">
+                <a16:creationId xmlns:a16="http://schemas.microsoft.com/office/drawing/2014/main" id="{63E41472-323F-47B9-8C9E-D3B43CA30C02}"/>
+              </a:ext>
+            </a:extLst>
+          </p:cNvPr>
+          <p:cNvSpPr>
+            <a:spLocks noGrp="1"/>
+          </p:cNvSpPr>
+          <p:nvPr>
+            <p:ph type="ctrTitle"/>
+          </p:nvPr>
+        </p:nvSpPr>
+        <p:spPr/>
+        <p:txBody>
+          <a:bodyPr/>
+          <a:lstStyle/>
+          <a:p>
+            <a:r>
+              <a:rPr lang="en-ZA" dirty="0"/>
+              <a:t>     Conclusion</a:t>
+            </a:r>
+          </a:p>
+        </p:txBody>
+      </p:sp>
+      <p:pic>
+        <p:nvPicPr>
+          <p:cNvPr id="10" name="Picture Placeholder 9">
+            <a:extLst>
+              <a:ext uri="{FF2B5EF4-FFF2-40B4-BE49-F238E27FC236}">
+                <a16:creationId xmlns:a16="http://schemas.microsoft.com/office/drawing/2014/main" id="{9663686B-44B2-425C-9F15-899A0641AA7D}"/>
+              </a:ext>
+            </a:extLst>
+          </p:cNvPr>
+          <p:cNvPicPr>
+            <a:picLocks noGrp="1" noChangeAspect="1"/>
+          </p:cNvPicPr>
+          <p:nvPr>
+            <p:ph type="pic" sz="quarter" idx="16"/>
+          </p:nvPr>
+        </p:nvPicPr>
+        <p:blipFill>
+          <a:blip r:embed="rId2">
+            <a:extLst>
+              <a:ext uri="{837473B0-CC2E-450A-ABE3-18F120FF3D39}">
+                <a1611:picAttrSrcUrl xmlns:a1611="http://schemas.microsoft.com/office/drawing/2016/11/main" r:id="rId3"/>
+              </a:ext>
+            </a:extLst>
+          </a:blip>
+          <a:stretch>
+            <a:fillRect/>
+          </a:stretch>
+        </p:blipFill>
+        <p:spPr>
+          <a:xfrm>
+            <a:off x="7652806" y="939291"/>
+            <a:ext cx="1872000" cy="1522456"/>
+          </a:xfrm>
+        </p:spPr>
+      </p:pic>
+      <p:pic>
+        <p:nvPicPr>
+          <p:cNvPr id="12" name="Picture Placeholder 11">
+            <a:extLst>
+              <a:ext uri="{FF2B5EF4-FFF2-40B4-BE49-F238E27FC236}">
+                <a16:creationId xmlns:a16="http://schemas.microsoft.com/office/drawing/2014/main" id="{C640A70E-BC90-4E9E-97DF-9D7362FEEC64}"/>
+              </a:ext>
+            </a:extLst>
+          </p:cNvPr>
+          <p:cNvPicPr>
+            <a:picLocks noGrp="1" noChangeAspect="1"/>
+          </p:cNvPicPr>
+          <p:nvPr>
+            <p:ph type="pic" sz="quarter" idx="17"/>
+          </p:nvPr>
+        </p:nvPicPr>
+        <p:blipFill>
+          <a:blip r:embed="rId4">
+            <a:extLst>
+              <a:ext uri="{BEBA8EAE-BF5A-486C-A8C5-ECC9F3942E4B}">
+                <a14:imgProps xmlns:a14="http://schemas.microsoft.com/office/drawing/2010/main">
+                  <a14:imgLayer r:embed="rId5">
+                    <a14:imgEffect>
+                      <a14:saturation sat="0"/>
+                    </a14:imgEffect>
+                  </a14:imgLayer>
+                </a14:imgProps>
+              </a:ext>
+              <a:ext uri="{837473B0-CC2E-450A-ABE3-18F120FF3D39}">
+                <a1611:picAttrSrcUrl xmlns:a1611="http://schemas.microsoft.com/office/drawing/2016/11/main" r:id="rId6"/>
+              </a:ext>
+            </a:extLst>
+          </a:blip>
+          <a:stretch>
+            <a:fillRect/>
+          </a:stretch>
+        </p:blipFill>
+        <p:spPr>
+          <a:xfrm>
+            <a:off x="9713594" y="939291"/>
+            <a:ext cx="2040474" cy="1522456"/>
+          </a:xfrm>
+        </p:spPr>
+      </p:pic>
+      <p:sp>
+        <p:nvSpPr>
+          <p:cNvPr id="5" name="Footer Placeholder 4">
+            <a:extLst>
+              <a:ext uri="{FF2B5EF4-FFF2-40B4-BE49-F238E27FC236}">
+                <a16:creationId xmlns:a16="http://schemas.microsoft.com/office/drawing/2014/main" id="{798981C9-C6B7-494A-8742-2D006C95F934}"/>
+              </a:ext>
+            </a:extLst>
+          </p:cNvPr>
+          <p:cNvSpPr>
+            <a:spLocks noGrp="1"/>
+          </p:cNvSpPr>
+          <p:nvPr>
+            <p:ph type="ftr" sz="quarter" idx="12"/>
+          </p:nvPr>
+        </p:nvSpPr>
+        <p:spPr/>
+        <p:txBody>
+          <a:bodyPr/>
+          <a:lstStyle/>
+          <a:p>
+            <a:r>
+              <a:rPr lang="en-ZA" dirty="0"/>
+              <a:t>Add a footer</a:t>
+            </a:r>
+          </a:p>
+        </p:txBody>
+      </p:sp>
+      <p:sp>
+        <p:nvSpPr>
+          <p:cNvPr id="4" name="Slide Number Placeholder 3">
+            <a:extLst>
+              <a:ext uri="{FF2B5EF4-FFF2-40B4-BE49-F238E27FC236}">
+                <a16:creationId xmlns:a16="http://schemas.microsoft.com/office/drawing/2014/main" id="{903F83A2-B38E-4405-A418-8BC7C1D25B8A}"/>
+              </a:ext>
+            </a:extLst>
+          </p:cNvPr>
+          <p:cNvSpPr>
+            <a:spLocks noGrp="1"/>
+          </p:cNvSpPr>
+          <p:nvPr>
+            <p:ph type="sldNum" sz="quarter" idx="11"/>
+          </p:nvPr>
+        </p:nvSpPr>
+        <p:spPr/>
+        <p:txBody>
+          <a:bodyPr/>
+          <a:lstStyle/>
+          <a:p>
+            <a:fld id="{19B51A1E-902D-48AF-9020-955120F399B6}" type="slidenum">
+              <a:rPr lang="en-ZA" smtClean="0"/>
+              <a:pPr/>
+              <a:t>11</a:t>
+            </a:fld>
+            <a:endParaRPr lang="en-ZA" dirty="0"/>
+          </a:p>
+        </p:txBody>
+      </p:sp>
+      <p:sp>
+        <p:nvSpPr>
+          <p:cNvPr id="3" name="TextBox 2">
+            <a:extLst>
+              <a:ext uri="{FF2B5EF4-FFF2-40B4-BE49-F238E27FC236}">
+                <a16:creationId xmlns:a16="http://schemas.microsoft.com/office/drawing/2014/main" id="{C5BECB16-5694-437B-857A-435D3D6271C6}"/>
+              </a:ext>
+            </a:extLst>
+          </p:cNvPr>
+          <p:cNvSpPr txBox="1"/>
+          <p:nvPr/>
+        </p:nvSpPr>
+        <p:spPr>
+          <a:xfrm>
+            <a:off x="419862" y="6209414"/>
+            <a:ext cx="1872000" cy="369332"/>
+          </a:xfrm>
+          <a:prstGeom prst="rect">
+            <a:avLst/>
+          </a:prstGeom>
+          <a:noFill/>
+        </p:spPr>
+        <p:txBody>
+          <a:bodyPr wrap="square" rtlCol="0">
+            <a:spAutoFit/>
+          </a:bodyPr>
+          <a:lstStyle/>
+          <a:p>
+            <a:r>
+              <a:rPr lang="en-US" sz="900" dirty="0">
+                <a:hlinkClick r:id="rId3" tooltip="http://nadanoslibradeescorpio.blogspot.com/2012/07/mapa-de-terremotos.html"/>
+              </a:rPr>
+              <a:t>Photo</a:t>
+            </a:r>
+            <a:r>
+              <a:rPr lang="en-US" sz="900" dirty="0"/>
+              <a:t>s by Unknown Author is licensed under </a:t>
+            </a:r>
+            <a:r>
+              <a:rPr lang="en-US" sz="900" dirty="0">
+                <a:hlinkClick r:id="rId7" tooltip="https://creativecommons.org/licenses/by-nc-nd/3.0/"/>
+              </a:rPr>
+              <a:t>CC BY-NC-ND</a:t>
+            </a:r>
+            <a:endParaRPr lang="en-US" sz="900" dirty="0"/>
+          </a:p>
+        </p:txBody>
+      </p:sp>
+    </p:spTree>
+    <p:extLst>
+      <p:ext uri="{BB962C8B-B14F-4D97-AF65-F5344CB8AC3E}">
+        <p14:creationId xmlns:p14="http://schemas.microsoft.com/office/powerpoint/2010/main" val="3515958340"/>
+      </p:ext>
+    </p:extLst>
+  </p:cSld>
+  <p:clrMapOvr>
+    <a:masterClrMapping/>
+  </p:clrMapOvr>
+</p:sld>
+</file>
+
+<file path=ppt/slides/slide12.xml><?xml version="1.0" encoding="utf-8"?>
+<p:sld xmlns:a="http://schemas.openxmlformats.org/drawingml/2006/main" xmlns:r="http://schemas.openxmlformats.org/officeDocument/2006/relationships" xmlns:p="http://schemas.openxmlformats.org/presentationml/2006/main">
+  <p:cSld>
+    <p:bg>
+      <p:bgPr>
+        <a:solidFill>
+          <a:schemeClr val="bg1"/>
+        </a:solidFill>
+        <a:effectLst/>
+      </p:bgPr>
+    </p:bg>
+    <p:spTree>
+      <p:nvGrpSpPr>
+        <p:cNvPr id="1" name=""/>
+        <p:cNvGrpSpPr/>
+        <p:nvPr/>
+      </p:nvGrpSpPr>
+      <p:grpSpPr>
+        <a:xfrm>
+          <a:off x="0" y="0"/>
+          <a:ext cx="0" cy="0"/>
+          <a:chOff x="0" y="0"/>
+          <a:chExt cx="0" cy="0"/>
+        </a:xfrm>
+      </p:grpSpPr>
+      <p:sp>
+        <p:nvSpPr>
+          <p:cNvPr id="17" name="Rectangle 16">
+            <a:extLst>
+              <a:ext uri="{FF2B5EF4-FFF2-40B4-BE49-F238E27FC236}">
+                <a16:creationId xmlns:a16="http://schemas.microsoft.com/office/drawing/2014/main" id="{B9FF99BD-075F-4761-A995-6FC574BD25EA}"/>
+              </a:ext>
+              <a:ext uri="{C183D7F6-B498-43B3-948B-1728B52AA6E4}">
+                <adec:decorative xmlns:adec="http://schemas.microsoft.com/office/drawing/2017/decorative" val="1"/>
+              </a:ext>
+            </a:extLst>
+          </p:cNvPr>
+          <p:cNvSpPr>
+            <a:spLocks noGrp="1" noRot="1" noChangeAspect="1" noMove="1" noResize="1" noEditPoints="1" noAdjustHandles="1" noChangeArrowheads="1" noChangeShapeType="1" noTextEdit="1"/>
+          </p:cNvSpPr>
+          <p:nvPr>
+            <p:extLst>
+              <p:ext uri="{386F3935-93C4-4BCD-93E2-E3B085C9AB24}">
+                <p16:designElem xmlns:p16="http://schemas.microsoft.com/office/powerpoint/2015/main" val="1"/>
+              </p:ext>
+            </p:extLst>
+          </p:nvPr>
+        </p:nvSpPr>
+        <p:spPr>
+          <a:xfrm>
+            <a:off x="0" y="0"/>
+            <a:ext cx="12192000" cy="6858000"/>
+          </a:xfrm>
+          <a:prstGeom prst="rect">
+            <a:avLst/>
+          </a:prstGeom>
+          <a:solidFill>
+            <a:schemeClr val="bg1">
+              <a:lumMod val="65000"/>
+            </a:schemeClr>
+          </a:solidFill>
+          <a:ln>
+            <a:noFill/>
+          </a:ln>
+        </p:spPr>
+        <p:style>
+          <a:lnRef idx="2">
+            <a:schemeClr val="accent1">
+              <a:shade val="50000"/>
+            </a:schemeClr>
+          </a:lnRef>
+          <a:fillRef idx="1">
+            <a:schemeClr val="accent1"/>
+          </a:fillRef>
+          <a:effectRef idx="0">
+            <a:schemeClr val="accent1"/>
+          </a:effectRef>
+          <a:fontRef idx="minor">
+            <a:schemeClr val="lt1"/>
+          </a:fontRef>
+        </p:style>
+        <p:txBody>
+          <a:bodyPr rtlCol="0" anchor="ctr"/>
+          <a:lstStyle/>
+          <a:p>
+            <a:pPr algn="ctr"/>
+            <a:endParaRPr lang="en-US"/>
+          </a:p>
+        </p:txBody>
+      </p:sp>
+      <p:sp>
+        <p:nvSpPr>
+          <p:cNvPr id="19" name="Rectangle 18">
+            <a:extLst>
+              <a:ext uri="{FF2B5EF4-FFF2-40B4-BE49-F238E27FC236}">
+                <a16:creationId xmlns:a16="http://schemas.microsoft.com/office/drawing/2014/main" id="{A7B21A54-9BA3-4EA9-B460-5A829ADD9051}"/>
+              </a:ext>
+              <a:ext uri="{C183D7F6-B498-43B3-948B-1728B52AA6E4}">
+                <adec:decorative xmlns:adec="http://schemas.microsoft.com/office/drawing/2017/decorative" val="1"/>
+              </a:ext>
+            </a:extLst>
+          </p:cNvPr>
+          <p:cNvSpPr>
+            <a:spLocks noGrp="1" noRot="1" noChangeAspect="1" noMove="1" noResize="1" noEditPoints="1" noAdjustHandles="1" noChangeArrowheads="1" noChangeShapeType="1" noTextEdit="1"/>
+          </p:cNvSpPr>
+          <p:nvPr>
+            <p:extLst>
+              <p:ext uri="{386F3935-93C4-4BCD-93E2-E3B085C9AB24}">
+                <p16:designElem xmlns:p16="http://schemas.microsoft.com/office/powerpoint/2015/main" val="1"/>
+              </p:ext>
+            </p:extLst>
+          </p:nvPr>
+        </p:nvSpPr>
+        <p:spPr>
+          <a:xfrm>
+            <a:off x="477012" y="480060"/>
+            <a:ext cx="11237976" cy="5897880"/>
+          </a:xfrm>
+          <a:prstGeom prst="rect">
+            <a:avLst/>
+          </a:prstGeom>
+          <a:noFill/>
+          <a:ln>
+            <a:solidFill>
+              <a:schemeClr val="bg1"/>
+            </a:solidFill>
+          </a:ln>
+        </p:spPr>
+        <p:style>
+          <a:lnRef idx="2">
+            <a:schemeClr val="accent1">
+              <a:shade val="50000"/>
+            </a:schemeClr>
+          </a:lnRef>
+          <a:fillRef idx="1">
+            <a:schemeClr val="accent1"/>
+          </a:fillRef>
+          <a:effectRef idx="0">
+            <a:schemeClr val="accent1"/>
+          </a:effectRef>
+          <a:fontRef idx="minor">
+            <a:schemeClr val="lt1"/>
+          </a:fontRef>
+        </p:style>
+        <p:txBody>
+          <a:bodyPr rtlCol="0" anchor="ctr"/>
+          <a:lstStyle/>
+          <a:p>
+            <a:pPr algn="ctr"/>
+            <a:endParaRPr lang="en-US"/>
+          </a:p>
+        </p:txBody>
+      </p:sp>
+      <p:sp>
+        <p:nvSpPr>
+          <p:cNvPr id="21" name="Rectangle 20">
+            <a:extLst>
+              <a:ext uri="{FF2B5EF4-FFF2-40B4-BE49-F238E27FC236}">
+                <a16:creationId xmlns:a16="http://schemas.microsoft.com/office/drawing/2014/main" id="{6FA8F714-B9D8-488A-8CCA-E9948FF913A9}"/>
+              </a:ext>
+              <a:ext uri="{C183D7F6-B498-43B3-948B-1728B52AA6E4}">
+                <adec:decorative xmlns:adec="http://schemas.microsoft.com/office/drawing/2017/decorative" val="1"/>
+              </a:ext>
+            </a:extLst>
+          </p:cNvPr>
+          <p:cNvSpPr>
+            <a:spLocks noGrp="1" noRot="1" noChangeAspect="1" noMove="1" noResize="1" noEditPoints="1" noAdjustHandles="1" noChangeArrowheads="1" noChangeShapeType="1" noTextEdit="1"/>
+          </p:cNvSpPr>
+          <p:nvPr>
+            <p:extLst>
+              <p:ext uri="{386F3935-93C4-4BCD-93E2-E3B085C9AB24}">
+                <p16:designElem xmlns:p16="http://schemas.microsoft.com/office/powerpoint/2015/main" val="1"/>
+              </p:ext>
+            </p:extLst>
+          </p:nvPr>
+        </p:nvSpPr>
+        <p:spPr>
+          <a:xfrm>
+            <a:off x="643466" y="643468"/>
+            <a:ext cx="10905067" cy="5571066"/>
+          </a:xfrm>
+          <a:prstGeom prst="rect">
+            <a:avLst/>
+          </a:prstGeom>
+          <a:solidFill>
+            <a:srgbClr val="FFFFFF"/>
+          </a:solidFill>
+          <a:ln>
+            <a:noFill/>
+          </a:ln>
+        </p:spPr>
+        <p:style>
+          <a:lnRef idx="2">
+            <a:schemeClr val="accent1">
+              <a:shade val="50000"/>
+            </a:schemeClr>
+          </a:lnRef>
+          <a:fillRef idx="1">
+            <a:schemeClr val="accent1"/>
+          </a:fillRef>
+          <a:effectRef idx="0">
+            <a:schemeClr val="accent1"/>
+          </a:effectRef>
+          <a:fontRef idx="minor">
+            <a:schemeClr val="lt1"/>
+          </a:fontRef>
+        </p:style>
+        <p:txBody>
+          <a:bodyPr rtlCol="0" anchor="ctr"/>
+          <a:lstStyle/>
+          <a:p>
+            <a:pPr algn="ctr"/>
+            <a:endParaRPr lang="en-US"/>
+          </a:p>
+        </p:txBody>
+      </p:sp>
+      <p:pic>
+        <p:nvPicPr>
+          <p:cNvPr id="5" name="Picture 4" descr="A picture containing clipart&#10;&#10;Description automatically generated">
+            <a:extLst>
+              <a:ext uri="{FF2B5EF4-FFF2-40B4-BE49-F238E27FC236}">
+                <a16:creationId xmlns:a16="http://schemas.microsoft.com/office/drawing/2014/main" id="{3FBD1A20-F02E-1B48-81EE-F8EF452B3DAD}"/>
+              </a:ext>
+            </a:extLst>
+          </p:cNvPr>
+          <p:cNvPicPr>
+            <a:picLocks noChangeAspect="1"/>
+          </p:cNvPicPr>
+          <p:nvPr/>
+        </p:nvPicPr>
+        <p:blipFill rotWithShape="1">
+          <a:blip r:embed="rId2"/>
+          <a:srcRect t="2759" b="7740"/>
+          <a:stretch/>
+        </p:blipFill>
+        <p:spPr>
+          <a:xfrm>
+            <a:off x="2666017" y="1123527"/>
+            <a:ext cx="6859961" cy="4604800"/>
+          </a:xfrm>
+          <a:prstGeom prst="rect">
+            <a:avLst/>
+          </a:prstGeom>
+        </p:spPr>
+      </p:pic>
+      <p:sp>
+        <p:nvSpPr>
+          <p:cNvPr id="2" name="Slide Number Placeholder 1">
+            <a:extLst>
+              <a:ext uri="{FF2B5EF4-FFF2-40B4-BE49-F238E27FC236}">
+                <a16:creationId xmlns:a16="http://schemas.microsoft.com/office/drawing/2014/main" id="{B9E2F80A-DEFA-4FAD-BB22-4236BAEB0495}"/>
+              </a:ext>
+            </a:extLst>
+          </p:cNvPr>
+          <p:cNvSpPr>
+            <a:spLocks noGrp="1"/>
+          </p:cNvSpPr>
+          <p:nvPr>
+            <p:ph type="sldNum" sz="quarter" idx="11"/>
+          </p:nvPr>
+        </p:nvSpPr>
+        <p:spPr>
+          <a:xfrm>
+            <a:off x="8610600" y="6356350"/>
+            <a:ext cx="2743200" cy="365125"/>
+          </a:xfrm>
+        </p:spPr>
+        <p:txBody>
+          <a:bodyPr vert="horz" lIns="91440" tIns="45720" rIns="91440" bIns="45720" rtlCol="0" anchor="ctr">
+            <a:normAutofit/>
+          </a:bodyPr>
+          <a:lstStyle/>
+          <a:p>
+            <a:pPr algn="r">
+              <a:spcAft>
+                <a:spcPts val="600"/>
+              </a:spcAft>
+            </a:pPr>
+            <a:fld id="{19B51A1E-902D-48AF-9020-955120F399B6}" type="slidenum">
+              <a:rPr lang="en-US" sz="1200">
+                <a:solidFill>
+                  <a:srgbClr val="FFFFFF"/>
+                </a:solidFill>
+                <a:latin typeface="+mn-lt"/>
+              </a:rPr>
+              <a:pPr algn="r">
+                <a:spcAft>
+                  <a:spcPts val="600"/>
+                </a:spcAft>
+              </a:pPr>
+              <a:t>12</a:t>
+            </a:fld>
+            <a:endParaRPr lang="en-US" sz="1200">
+              <a:solidFill>
+                <a:srgbClr val="FFFFFF"/>
+              </a:solidFill>
+              <a:latin typeface="+mn-lt"/>
+            </a:endParaRPr>
+          </a:p>
+        </p:txBody>
+      </p:sp>
+    </p:spTree>
+    <p:extLst>
+      <p:ext uri="{BB962C8B-B14F-4D97-AF65-F5344CB8AC3E}">
+        <p14:creationId xmlns:p14="http://schemas.microsoft.com/office/powerpoint/2010/main" val="59582380"/>
+      </p:ext>
+    </p:extLst>
+  </p:cSld>
+  <p:clrMapOvr>
+    <a:masterClrMapping/>
+  </p:clrMapOvr>
+</p:sld>
+</file>
+
+<file path=ppt/slides/slide13.xml><?xml version="1.0" encoding="utf-8"?>
+<p:sld xmlns:a="http://schemas.openxmlformats.org/drawingml/2006/main" xmlns:r="http://schemas.openxmlformats.org/officeDocument/2006/relationships" xmlns:p="http://schemas.openxmlformats.org/presentationml/2006/main">
+  <p:cSld>
+    <p:spTree>
+      <p:nvGrpSpPr>
+        <p:cNvPr id="1" name=""/>
+        <p:cNvGrpSpPr/>
+        <p:nvPr/>
+      </p:nvGrpSpPr>
+      <p:grpSpPr>
+        <a:xfrm>
+          <a:off x="0" y="0"/>
+          <a:ext cx="0" cy="0"/>
+          <a:chOff x="0" y="0"/>
+          <a:chExt cx="0" cy="0"/>
+        </a:xfrm>
+      </p:grpSpPr>
+      <p:sp>
+        <p:nvSpPr>
+          <p:cNvPr id="5" name="Content Placeholder 4">
+            <a:extLst>
+              <a:ext uri="{FF2B5EF4-FFF2-40B4-BE49-F238E27FC236}">
+                <a16:creationId xmlns:a16="http://schemas.microsoft.com/office/drawing/2014/main" id="{E8D50585-317E-4561-AC12-330089F7A34C}"/>
+              </a:ext>
+            </a:extLst>
+          </p:cNvPr>
+          <p:cNvSpPr>
+            <a:spLocks noGrp="1"/>
+          </p:cNvSpPr>
+          <p:nvPr>
+            <p:ph idx="1"/>
+          </p:nvPr>
+        </p:nvSpPr>
+        <p:spPr>
+          <a:xfrm>
+            <a:off x="424370" y="1272208"/>
+            <a:ext cx="11340000" cy="4660183"/>
+          </a:xfrm>
+        </p:spPr>
+        <p:txBody>
+          <a:bodyPr/>
+          <a:lstStyle/>
+          <a:p>
+            <a:r>
+              <a:rPr lang="en-US" sz="2000" dirty="0"/>
+              <a:t>FBI crime data:</a:t>
+            </a:r>
+          </a:p>
+          <a:p>
+            <a:pPr lvl="1"/>
+            <a:r>
+              <a:rPr lang="en-US" sz="2000" dirty="0"/>
+              <a:t>https://crime-data-explorer.fr.cloud.gov/api </a:t>
+            </a:r>
+          </a:p>
+          <a:p>
+            <a:r>
+              <a:rPr lang="en-US" sz="2000" dirty="0"/>
+              <a:t>Census Data:</a:t>
+            </a:r>
+          </a:p>
+          <a:p>
+            <a:pPr lvl="1"/>
+            <a:endParaRPr lang="en-US" sz="1800" dirty="0"/>
+          </a:p>
+          <a:p>
+            <a:r>
+              <a:rPr lang="en-US" sz="2000" dirty="0"/>
+              <a:t>Google Maps:</a:t>
+            </a:r>
+          </a:p>
+          <a:p>
+            <a:pPr lvl="1"/>
+            <a:endParaRPr lang="en-US" sz="1800" dirty="0"/>
+          </a:p>
+          <a:p>
+            <a:r>
+              <a:rPr lang="en-US" sz="2000" dirty="0"/>
+              <a:t>News Article about police activity post Ike</a:t>
+            </a:r>
+          </a:p>
+          <a:p>
+            <a:pPr lvl="1"/>
+            <a:r>
+              <a:rPr lang="en-US" sz="2000" dirty="0">
+                <a:hlinkClick r:id="rId3"/>
+              </a:rPr>
+              <a:t>https://www.chron.com/news/hurricanes/article/Looters-think-twice-as-police-up-patrol-arrest-1591018.php</a:t>
+            </a:r>
+            <a:endParaRPr lang="en-US" sz="2000" dirty="0"/>
+          </a:p>
+          <a:p>
+            <a:endParaRPr lang="en-US" dirty="0"/>
+          </a:p>
+        </p:txBody>
+      </p:sp>
+      <p:sp>
+        <p:nvSpPr>
+          <p:cNvPr id="2" name="Slide Number Placeholder 1">
+            <a:extLst>
+              <a:ext uri="{FF2B5EF4-FFF2-40B4-BE49-F238E27FC236}">
+                <a16:creationId xmlns:a16="http://schemas.microsoft.com/office/drawing/2014/main" id="{B9E2F80A-DEFA-4FAD-BB22-4236BAEB0495}"/>
+              </a:ext>
+            </a:extLst>
+          </p:cNvPr>
+          <p:cNvSpPr>
+            <a:spLocks noGrp="1"/>
+          </p:cNvSpPr>
+          <p:nvPr>
+            <p:ph type="sldNum" sz="quarter" idx="11"/>
+          </p:nvPr>
+        </p:nvSpPr>
+        <p:spPr/>
+        <p:txBody>
+          <a:bodyPr/>
+          <a:lstStyle/>
+          <a:p>
+            <a:fld id="{19B51A1E-902D-48AF-9020-955120F399B6}" type="slidenum">
+              <a:rPr lang="en-ZA" smtClean="0"/>
+              <a:pPr/>
+              <a:t>13</a:t>
+            </a:fld>
+            <a:endParaRPr lang="en-ZA" dirty="0"/>
+          </a:p>
+        </p:txBody>
+      </p:sp>
+      <p:sp>
+        <p:nvSpPr>
+          <p:cNvPr id="4" name="Title 3">
+            <a:extLst>
+              <a:ext uri="{FF2B5EF4-FFF2-40B4-BE49-F238E27FC236}">
+                <a16:creationId xmlns:a16="http://schemas.microsoft.com/office/drawing/2014/main" id="{E98DCA46-603B-4178-8707-30E192CE6B8D}"/>
+              </a:ext>
+            </a:extLst>
+          </p:cNvPr>
+          <p:cNvSpPr>
+            <a:spLocks noGrp="1"/>
+          </p:cNvSpPr>
+          <p:nvPr>
+            <p:ph type="title"/>
+          </p:nvPr>
+        </p:nvSpPr>
+        <p:spPr/>
+        <p:txBody>
+          <a:bodyPr/>
+          <a:lstStyle/>
+          <a:p>
+            <a:r>
+              <a:rPr lang="en-US" dirty="0"/>
+              <a:t>Sources</a:t>
+            </a:r>
           </a:p>
         </p:txBody>
       </p:sp>
@@ -21820,20 +22913,19 @@
             <p:ph idx="1"/>
           </p:nvPr>
         </p:nvSpPr>
-        <p:spPr/>
+        <p:spPr>
+          <a:xfrm>
+            <a:off x="424370" y="1308100"/>
+            <a:ext cx="11340000" cy="4624291"/>
+          </a:xfrm>
+        </p:spPr>
         <p:txBody>
           <a:bodyPr/>
           <a:lstStyle/>
           <a:p>
+            <a:pPr lvl="1"/>
             <a:r>
               <a:rPr lang="en-US" sz="3200" dirty="0"/>
-              <a:t>How was Galveston, TX affected by Hurricane Ike and Louisa County, VA affected by Earthquake in 2011?</a:t>
-            </a:r>
-          </a:p>
-          <a:p>
-            <a:pPr lvl="1"/>
-            <a:r>
-              <a:rPr lang="en-US" sz="3000" dirty="0"/>
               <a:t>Local Enforcement ‘Agencies’ (police stations)</a:t>
             </a:r>
           </a:p>
@@ -21847,7 +22939,7 @@
           <a:p>
             <a:pPr lvl="1"/>
             <a:r>
-              <a:rPr lang="en-US" sz="3000" dirty="0"/>
+              <a:rPr lang="en-US" sz="3200" dirty="0"/>
               <a:t>Census Stats</a:t>
             </a:r>
           </a:p>
@@ -21868,14 +22960,14 @@
           <a:p>
             <a:pPr lvl="1"/>
             <a:r>
-              <a:rPr lang="en-US" sz="3000" dirty="0"/>
+              <a:rPr lang="en-US" sz="3200" dirty="0"/>
               <a:t>Conclusion</a:t>
             </a:r>
           </a:p>
           <a:p>
             <a:pPr lvl="1"/>
             <a:r>
-              <a:rPr lang="en-US" sz="3000" dirty="0"/>
+              <a:rPr lang="en-US" sz="3200" dirty="0"/>
               <a:t>Q/A</a:t>
             </a:r>
           </a:p>
@@ -21955,14 +23047,19 @@
             <p:ph type="title"/>
           </p:nvPr>
         </p:nvSpPr>
-        <p:spPr/>
+        <p:spPr>
+          <a:xfrm>
+            <a:off x="432000" y="432000"/>
+            <a:ext cx="11340000" cy="876100"/>
+          </a:xfrm>
+        </p:spPr>
         <p:txBody>
           <a:bodyPr/>
           <a:lstStyle/>
           <a:p>
             <a:r>
-              <a:rPr lang="en-US" sz="4400" dirty="0"/>
-              <a:t>Agenda</a:t>
+              <a:rPr lang="en-US" dirty="0"/>
+              <a:t>How are communities affected by natural disasters?</a:t>
             </a:r>
           </a:p>
         </p:txBody>
@@ -22013,90 +23110,104 @@
             <p:ph idx="1"/>
           </p:nvPr>
         </p:nvSpPr>
-        <p:spPr/>
+        <p:spPr>
+          <a:xfrm>
+            <a:off x="424370" y="1272208"/>
+            <a:ext cx="7637155" cy="4660183"/>
+          </a:xfrm>
+        </p:spPr>
         <p:txBody>
           <a:bodyPr/>
           <a:lstStyle/>
           <a:p>
             <a:r>
-              <a:rPr lang="en-US" sz="2000" dirty="0"/>
-              <a:t>Source</a:t>
+              <a:rPr lang="en-US" sz="2400" dirty="0"/>
+              <a:t>Sources</a:t>
             </a:r>
           </a:p>
           <a:p>
             <a:pPr lvl="1"/>
             <a:r>
-              <a:rPr lang="en-US" sz="2000" dirty="0"/>
-              <a:t>FBI National Incident-Based Reporting System (NIBRS) CSV files</a:t>
+              <a:rPr lang="en-US" sz="2400" dirty="0"/>
+              <a:t>CSV from FBI National Incident-Based Reporting System (NIBRS)</a:t>
+            </a:r>
+          </a:p>
+          <a:p>
+            <a:r>
+              <a:rPr lang="en-US" sz="2400" dirty="0"/>
+              <a:t>Analysis</a:t>
             </a:r>
           </a:p>
           <a:p>
             <a:pPr lvl="1"/>
             <a:r>
-              <a:rPr lang="en-US" sz="2000" dirty="0"/>
-              <a:t>Google Maps API</a:t>
-            </a:r>
-          </a:p>
-          <a:p>
-            <a:r>
-              <a:rPr lang="en-US" sz="2000" dirty="0"/>
-              <a:t>Analysis</a:t>
+              <a:rPr lang="en-US" sz="2400" dirty="0"/>
+              <a:t>TX agencies</a:t>
+            </a:r>
+          </a:p>
+          <a:p>
+            <a:pPr lvl="2"/>
+            <a:r>
+              <a:rPr lang="en-US" sz="2400" dirty="0"/>
+              <a:t>All – 1099</a:t>
+            </a:r>
+          </a:p>
+          <a:p>
+            <a:pPr lvl="2"/>
+            <a:r>
+              <a:rPr lang="en-US" sz="2400" dirty="0"/>
+              <a:t>After drop null </a:t>
+            </a:r>
+            <a:r>
+              <a:rPr lang="en-US" sz="2400" dirty="0" err="1"/>
+              <a:t>lat</a:t>
+            </a:r>
+            <a:r>
+              <a:rPr lang="en-US" sz="2400" dirty="0"/>
+              <a:t>/long – 1094</a:t>
+            </a:r>
+          </a:p>
+          <a:p>
+            <a:pPr lvl="2"/>
+            <a:r>
+              <a:rPr lang="en-US" sz="2400" dirty="0"/>
+              <a:t>Participating – 76</a:t>
             </a:r>
           </a:p>
           <a:p>
             <a:pPr lvl="1"/>
             <a:r>
-              <a:rPr lang="en-US" sz="2000" dirty="0"/>
-              <a:t>TX agencies</a:t>
+              <a:rPr lang="en-US" sz="2400" dirty="0"/>
+              <a:t>VA agencies</a:t>
             </a:r>
           </a:p>
           <a:p>
             <a:pPr lvl="2"/>
             <a:r>
-              <a:rPr lang="en-US" sz="2000" dirty="0"/>
-              <a:t>All – </a:t>
+              <a:rPr lang="en-US" sz="2400" dirty="0"/>
+              <a:t>All VA– 455</a:t>
             </a:r>
           </a:p>
           <a:p>
             <a:pPr lvl="2"/>
             <a:r>
-              <a:rPr lang="en-US" sz="2000" dirty="0"/>
-              <a:t>After Null values – </a:t>
+              <a:rPr lang="en-US" sz="2400" dirty="0"/>
+              <a:t>After drop null </a:t>
+            </a:r>
+            <a:r>
+              <a:rPr lang="en-US" sz="2400" dirty="0" err="1"/>
+              <a:t>lat</a:t>
+            </a:r>
+            <a:r>
+              <a:rPr lang="en-US" sz="2400" dirty="0"/>
+              <a:t>/long – 452</a:t>
             </a:r>
           </a:p>
           <a:p>
             <a:pPr lvl="2"/>
             <a:r>
-              <a:rPr lang="en-US" sz="2000" dirty="0"/>
-              <a:t>Participating -</a:t>
-            </a:r>
-          </a:p>
-          <a:p>
-            <a:pPr lvl="1"/>
-            <a:r>
-              <a:rPr lang="en-US" sz="2000" dirty="0"/>
-              <a:t>VA agencies</a:t>
-            </a:r>
-          </a:p>
-          <a:p>
-            <a:pPr lvl="2"/>
-            <a:r>
-              <a:rPr lang="en-US" sz="2000" dirty="0"/>
-              <a:t>All – 454</a:t>
-            </a:r>
-          </a:p>
-          <a:p>
-            <a:pPr lvl="2"/>
-            <a:r>
-              <a:rPr lang="en-US" sz="2000" dirty="0"/>
-              <a:t>After Null values – 380</a:t>
-            </a:r>
-          </a:p>
-          <a:p>
-            <a:pPr lvl="2"/>
-            <a:r>
-              <a:rPr lang="en-US" sz="2000" dirty="0"/>
-              <a:t>Participating – 350</a:t>
+              <a:rPr lang="en-US" sz="2400" dirty="0"/>
+              <a:t>All VA Participating – 410</a:t>
             </a:r>
           </a:p>
         </p:txBody>
@@ -22182,7 +23293,7 @@
           <a:p>
             <a:r>
               <a:rPr lang="en-US" dirty="0"/>
-              <a:t>Agencies - Intro</a:t>
+              <a:t>Agencies</a:t>
             </a:r>
           </a:p>
         </p:txBody>
@@ -22249,18 +23360,18 @@
       </p:grpSpPr>
       <p:sp>
         <p:nvSpPr>
-          <p:cNvPr id="2" name="Content Placeholder 1">
-            <a:extLst>
-              <a:ext uri="{FF2B5EF4-FFF2-40B4-BE49-F238E27FC236}">
-                <a16:creationId xmlns:a16="http://schemas.microsoft.com/office/drawing/2014/main" id="{73416882-5670-4C40-A366-8D841513824D}"/>
-              </a:ext>
-            </a:extLst>
-          </p:cNvPr>
-          <p:cNvSpPr>
-            <a:spLocks noGrp="1"/>
-          </p:cNvSpPr>
-          <p:nvPr>
-            <p:ph idx="1"/>
+          <p:cNvPr id="2" name="Title 1">
+            <a:extLst>
+              <a:ext uri="{FF2B5EF4-FFF2-40B4-BE49-F238E27FC236}">
+                <a16:creationId xmlns:a16="http://schemas.microsoft.com/office/drawing/2014/main" id="{9C5382B5-21E6-43CB-B5D4-0ADF664BF610}"/>
+              </a:ext>
+            </a:extLst>
+          </p:cNvPr>
+          <p:cNvSpPr>
+            <a:spLocks noGrp="1"/>
+          </p:cNvSpPr>
+          <p:nvPr>
+            <p:ph type="title"/>
           </p:nvPr>
         </p:nvSpPr>
         <p:spPr/>
@@ -22270,23 +23381,46 @@
           <a:p>
             <a:r>
               <a:rPr lang="en-US" dirty="0"/>
-              <a:t>API pull from FBI National Incident-Based Reporting System (NIBRS) CSV files</a:t>
-            </a:r>
-          </a:p>
-          <a:p>
-            <a:r>
-              <a:rPr lang="en-US" dirty="0"/>
-              <a:t> </a:t>
-            </a:r>
-          </a:p>
-        </p:txBody>
-      </p:sp>
-      <p:sp>
-        <p:nvSpPr>
-          <p:cNvPr id="3" name="Slide Number Placeholder 2">
-            <a:extLst>
-              <a:ext uri="{FF2B5EF4-FFF2-40B4-BE49-F238E27FC236}">
-                <a16:creationId xmlns:a16="http://schemas.microsoft.com/office/drawing/2014/main" id="{E6E438A9-7A49-4873-87AA-B00C0DE2FD1C}"/>
+              <a:t>Participating Agencies vs Registered Agencies</a:t>
+            </a:r>
+          </a:p>
+        </p:txBody>
+      </p:sp>
+      <p:sp>
+        <p:nvSpPr>
+          <p:cNvPr id="3" name="Footer Placeholder 2">
+            <a:extLst>
+              <a:ext uri="{FF2B5EF4-FFF2-40B4-BE49-F238E27FC236}">
+                <a16:creationId xmlns:a16="http://schemas.microsoft.com/office/drawing/2014/main" id="{C248D1D7-6A0E-49AC-93DF-196968B5B9E0}"/>
+              </a:ext>
+            </a:extLst>
+          </p:cNvPr>
+          <p:cNvSpPr>
+            <a:spLocks noGrp="1"/>
+          </p:cNvSpPr>
+          <p:nvPr>
+            <p:ph type="ftr" sz="quarter" idx="10"/>
+          </p:nvPr>
+        </p:nvSpPr>
+        <p:spPr/>
+        <p:txBody>
+          <a:bodyPr/>
+          <a:lstStyle/>
+          <a:p>
+            <a:r>
+              <a:rPr lang="en-ZA"/>
+              <a:t>Add a footer</a:t>
+            </a:r>
+            <a:endParaRPr lang="en-ZA" dirty="0"/>
+          </a:p>
+        </p:txBody>
+      </p:sp>
+      <p:sp>
+        <p:nvSpPr>
+          <p:cNvPr id="4" name="Slide Number Placeholder 3">
+            <a:extLst>
+              <a:ext uri="{FF2B5EF4-FFF2-40B4-BE49-F238E27FC236}">
+                <a16:creationId xmlns:a16="http://schemas.microsoft.com/office/drawing/2014/main" id="{950137EA-0279-4DAA-8C8E-553B2E857884}"/>
               </a:ext>
             </a:extLst>
           </p:cNvPr>
@@ -22311,59 +23445,68 @@
           </a:p>
         </p:txBody>
       </p:sp>
-      <p:sp>
-        <p:nvSpPr>
-          <p:cNvPr id="4" name="Footer Placeholder 3">
-            <a:extLst>
-              <a:ext uri="{FF2B5EF4-FFF2-40B4-BE49-F238E27FC236}">
-                <a16:creationId xmlns:a16="http://schemas.microsoft.com/office/drawing/2014/main" id="{50D6945F-BD17-45B9-989C-DD613DFA6427}"/>
-              </a:ext>
-            </a:extLst>
-          </p:cNvPr>
-          <p:cNvSpPr>
-            <a:spLocks noGrp="1"/>
-          </p:cNvSpPr>
-          <p:nvPr>
-            <p:ph type="ftr" sz="quarter" idx="12"/>
-          </p:nvPr>
-        </p:nvSpPr>
-        <p:spPr/>
-        <p:txBody>
-          <a:bodyPr/>
+      <p:pic>
+        <p:nvPicPr>
+          <p:cNvPr id="6" name="Picture 5">
+            <a:extLst>
+              <a:ext uri="{FF2B5EF4-FFF2-40B4-BE49-F238E27FC236}">
+                <a16:creationId xmlns:a16="http://schemas.microsoft.com/office/drawing/2014/main" id="{F40AE000-3688-436C-9E2F-CDE6A5096AB7}"/>
+              </a:ext>
+            </a:extLst>
+          </p:cNvPr>
+          <p:cNvPicPr>
+            <a:picLocks noChangeAspect="1"/>
+          </p:cNvPicPr>
+          <p:nvPr/>
+        </p:nvPicPr>
+        <p:blipFill>
+          <a:blip r:embed="rId2"/>
+          <a:stretch>
+            <a:fillRect/>
+          </a:stretch>
+        </p:blipFill>
+        <p:spPr>
+          <a:xfrm>
+            <a:off x="532144" y="1052513"/>
+            <a:ext cx="11281866" cy="4548187"/>
+          </a:xfrm>
+          <a:prstGeom prst="rect">
+            <a:avLst/>
+          </a:prstGeom>
+        </p:spPr>
+      </p:pic>
+      <p:sp>
+        <p:nvSpPr>
+          <p:cNvPr id="9" name="TextBox 8">
+            <a:extLst>
+              <a:ext uri="{FF2B5EF4-FFF2-40B4-BE49-F238E27FC236}">
+                <a16:creationId xmlns:a16="http://schemas.microsoft.com/office/drawing/2014/main" id="{B0BFF5E0-A0AC-4F14-AF8F-3AB9FCFEF105}"/>
+              </a:ext>
+            </a:extLst>
+          </p:cNvPr>
+          <p:cNvSpPr txBox="1"/>
+          <p:nvPr/>
+        </p:nvSpPr>
+        <p:spPr>
+          <a:xfrm>
+            <a:off x="532144" y="5772150"/>
+            <a:ext cx="5563856" cy="461665"/>
+          </a:xfrm>
+          <a:prstGeom prst="rect">
+            <a:avLst/>
+          </a:prstGeom>
+          <a:noFill/>
+        </p:spPr>
+        <p:txBody>
+          <a:bodyPr wrap="square" rtlCol="0">
+            <a:spAutoFit/>
+          </a:bodyPr>
           <a:lstStyle/>
           <a:p>
-            <a:r>
-              <a:rPr lang="en-ZA"/>
-              <a:t>Add a footer</a:t>
-            </a:r>
-            <a:endParaRPr lang="en-ZA" dirty="0"/>
-          </a:p>
-        </p:txBody>
-      </p:sp>
-      <p:sp>
-        <p:nvSpPr>
-          <p:cNvPr id="5" name="Title 4">
-            <a:extLst>
-              <a:ext uri="{FF2B5EF4-FFF2-40B4-BE49-F238E27FC236}">
-                <a16:creationId xmlns:a16="http://schemas.microsoft.com/office/drawing/2014/main" id="{76A3CA81-7A6C-47BC-8D67-926B325F8336}"/>
-              </a:ext>
-            </a:extLst>
-          </p:cNvPr>
-          <p:cNvSpPr>
-            <a:spLocks noGrp="1"/>
-          </p:cNvSpPr>
-          <p:nvPr>
-            <p:ph type="title"/>
-          </p:nvPr>
-        </p:nvSpPr>
-        <p:spPr/>
-        <p:txBody>
-          <a:bodyPr/>
-          <a:lstStyle/>
-          <a:p>
-            <a:r>
-              <a:rPr lang="en-US" dirty="0"/>
-              <a:t>Crime Intro</a:t>
+            <a:pPr lvl="1"/>
+            <a:r>
+              <a:rPr lang="en-US" sz="2400" dirty="0"/>
+              <a:t>Google Maps API</a:t>
             </a:r>
           </a:p>
         </p:txBody>
@@ -22371,7 +23514,7 @@
     </p:spTree>
     <p:extLst>
       <p:ext uri="{BB962C8B-B14F-4D97-AF65-F5344CB8AC3E}">
-        <p14:creationId xmlns:p14="http://schemas.microsoft.com/office/powerpoint/2010/main" val="2389633252"/>
+        <p14:creationId xmlns:p14="http://schemas.microsoft.com/office/powerpoint/2010/main" val="3537046617"/>
       </p:ext>
     </p:extLst>
   </p:cSld>
@@ -22400,18 +23543,18 @@
       </p:grpSpPr>
       <p:sp>
         <p:nvSpPr>
-          <p:cNvPr id="2" name="Content Placeholder 1">
-            <a:extLst>
-              <a:ext uri="{FF2B5EF4-FFF2-40B4-BE49-F238E27FC236}">
-                <a16:creationId xmlns:a16="http://schemas.microsoft.com/office/drawing/2014/main" id="{73416882-5670-4C40-A366-8D841513824D}"/>
-              </a:ext>
-            </a:extLst>
-          </p:cNvPr>
-          <p:cNvSpPr>
-            <a:spLocks noGrp="1"/>
-          </p:cNvSpPr>
-          <p:nvPr>
-            <p:ph idx="1"/>
+          <p:cNvPr id="2" name="Title 1">
+            <a:extLst>
+              <a:ext uri="{FF2B5EF4-FFF2-40B4-BE49-F238E27FC236}">
+                <a16:creationId xmlns:a16="http://schemas.microsoft.com/office/drawing/2014/main" id="{9C5382B5-21E6-43CB-B5D4-0ADF664BF610}"/>
+              </a:ext>
+            </a:extLst>
+          </p:cNvPr>
+          <p:cNvSpPr>
+            <a:spLocks noGrp="1"/>
+          </p:cNvSpPr>
+          <p:nvPr>
+            <p:ph type="title"/>
           </p:nvPr>
         </p:nvSpPr>
         <p:spPr/>
@@ -22421,63 +23564,46 @@
           <a:p>
             <a:r>
               <a:rPr lang="en-US" dirty="0"/>
-              <a:t> Where did data come from?</a:t>
-            </a:r>
-          </a:p>
-          <a:p>
-            <a:pPr lvl="1"/>
-            <a:r>
-              <a:rPr lang="en-US" dirty="0"/>
-              <a:t>Both data (population estimate for Galveston city and Louisa county) came from Census Data API.</a:t>
-            </a:r>
-          </a:p>
-          <a:p>
-            <a:r>
-              <a:rPr lang="en-US" dirty="0"/>
-              <a:t>How much start with?</a:t>
-            </a:r>
-          </a:p>
-          <a:p>
-            <a:pPr lvl="1"/>
-            <a:r>
-              <a:rPr lang="en-US" dirty="0"/>
-              <a:t>Pulling Census data was pretty straight forward process with a few issues; thus, we had obtained exactly what we needed. The websites contained information on how to pull exact data and reference to variables. The variables we have gather are: Population estimate, Geographic name, Place based on FIPS codes, Dates, and States.</a:t>
-            </a:r>
-          </a:p>
-          <a:p>
-            <a:r>
-              <a:rPr lang="en-US" dirty="0"/>
-              <a:t>How much removed? Why?</a:t>
-            </a:r>
-          </a:p>
-          <a:p>
-            <a:pPr lvl="1"/>
-            <a:r>
-              <a:rPr lang="en-US" dirty="0"/>
-              <a:t>After further processing the data, we have removed some variables such as State and County because that information was provided in different columns.</a:t>
-            </a:r>
-          </a:p>
-          <a:p>
-            <a:r>
-              <a:rPr lang="en-US" dirty="0"/>
-              <a:t>What is left?</a:t>
-            </a:r>
-          </a:p>
-          <a:p>
-            <a:pPr lvl="1"/>
-            <a:r>
-              <a:rPr lang="en-US" dirty="0"/>
-              <a:t>We have left the only columns we needed to graph our plots such as Population, County/City, State, and Year.</a:t>
-            </a:r>
-          </a:p>
-        </p:txBody>
-      </p:sp>
-      <p:sp>
-        <p:nvSpPr>
-          <p:cNvPr id="3" name="Slide Number Placeholder 2">
-            <a:extLst>
-              <a:ext uri="{FF2B5EF4-FFF2-40B4-BE49-F238E27FC236}">
-                <a16:creationId xmlns:a16="http://schemas.microsoft.com/office/drawing/2014/main" id="{E6E438A9-7A49-4873-87AA-B00C0DE2FD1C}"/>
+              <a:t>Participating Agencies vs Registered Agencies</a:t>
+            </a:r>
+          </a:p>
+        </p:txBody>
+      </p:sp>
+      <p:sp>
+        <p:nvSpPr>
+          <p:cNvPr id="3" name="Footer Placeholder 2">
+            <a:extLst>
+              <a:ext uri="{FF2B5EF4-FFF2-40B4-BE49-F238E27FC236}">
+                <a16:creationId xmlns:a16="http://schemas.microsoft.com/office/drawing/2014/main" id="{C248D1D7-6A0E-49AC-93DF-196968B5B9E0}"/>
+              </a:ext>
+            </a:extLst>
+          </p:cNvPr>
+          <p:cNvSpPr>
+            <a:spLocks noGrp="1"/>
+          </p:cNvSpPr>
+          <p:nvPr>
+            <p:ph type="ftr" sz="quarter" idx="10"/>
+          </p:nvPr>
+        </p:nvSpPr>
+        <p:spPr/>
+        <p:txBody>
+          <a:bodyPr/>
+          <a:lstStyle/>
+          <a:p>
+            <a:r>
+              <a:rPr lang="en-ZA"/>
+              <a:t>Add a footer</a:t>
+            </a:r>
+            <a:endParaRPr lang="en-ZA" dirty="0"/>
+          </a:p>
+        </p:txBody>
+      </p:sp>
+      <p:sp>
+        <p:nvSpPr>
+          <p:cNvPr id="4" name="Slide Number Placeholder 3">
+            <a:extLst>
+              <a:ext uri="{FF2B5EF4-FFF2-40B4-BE49-F238E27FC236}">
+                <a16:creationId xmlns:a16="http://schemas.microsoft.com/office/drawing/2014/main" id="{950137EA-0279-4DAA-8C8E-553B2E857884}"/>
               </a:ext>
             </a:extLst>
           </p:cNvPr>
@@ -22502,59 +23628,68 @@
           </a:p>
         </p:txBody>
       </p:sp>
-      <p:sp>
-        <p:nvSpPr>
-          <p:cNvPr id="4" name="Footer Placeholder 3">
-            <a:extLst>
-              <a:ext uri="{FF2B5EF4-FFF2-40B4-BE49-F238E27FC236}">
-                <a16:creationId xmlns:a16="http://schemas.microsoft.com/office/drawing/2014/main" id="{50D6945F-BD17-45B9-989C-DD613DFA6427}"/>
-              </a:ext>
-            </a:extLst>
-          </p:cNvPr>
-          <p:cNvSpPr>
-            <a:spLocks noGrp="1"/>
-          </p:cNvSpPr>
-          <p:nvPr>
-            <p:ph type="ftr" sz="quarter" idx="12"/>
-          </p:nvPr>
-        </p:nvSpPr>
-        <p:spPr/>
-        <p:txBody>
-          <a:bodyPr/>
+      <p:pic>
+        <p:nvPicPr>
+          <p:cNvPr id="8" name="Picture 7">
+            <a:extLst>
+              <a:ext uri="{FF2B5EF4-FFF2-40B4-BE49-F238E27FC236}">
+                <a16:creationId xmlns:a16="http://schemas.microsoft.com/office/drawing/2014/main" id="{68830026-67B3-4998-B316-B46031615F2E}"/>
+              </a:ext>
+            </a:extLst>
+          </p:cNvPr>
+          <p:cNvPicPr>
+            <a:picLocks noChangeAspect="1"/>
+          </p:cNvPicPr>
+          <p:nvPr/>
+        </p:nvPicPr>
+        <p:blipFill>
+          <a:blip r:embed="rId2"/>
+          <a:stretch>
+            <a:fillRect/>
+          </a:stretch>
+        </p:blipFill>
+        <p:spPr>
+          <a:xfrm>
+            <a:off x="432000" y="1083863"/>
+            <a:ext cx="11452186" cy="4616850"/>
+          </a:xfrm>
+          <a:prstGeom prst="rect">
+            <a:avLst/>
+          </a:prstGeom>
+        </p:spPr>
+      </p:pic>
+      <p:sp>
+        <p:nvSpPr>
+          <p:cNvPr id="7" name="TextBox 6">
+            <a:extLst>
+              <a:ext uri="{FF2B5EF4-FFF2-40B4-BE49-F238E27FC236}">
+                <a16:creationId xmlns:a16="http://schemas.microsoft.com/office/drawing/2014/main" id="{24C5603E-545A-41D5-900F-0651800D5AD0}"/>
+              </a:ext>
+            </a:extLst>
+          </p:cNvPr>
+          <p:cNvSpPr txBox="1"/>
+          <p:nvPr/>
+        </p:nvSpPr>
+        <p:spPr>
+          <a:xfrm>
+            <a:off x="532144" y="5772150"/>
+            <a:ext cx="5563856" cy="461665"/>
+          </a:xfrm>
+          <a:prstGeom prst="rect">
+            <a:avLst/>
+          </a:prstGeom>
+          <a:noFill/>
+        </p:spPr>
+        <p:txBody>
+          <a:bodyPr wrap="square" rtlCol="0">
+            <a:spAutoFit/>
+          </a:bodyPr>
           <a:lstStyle/>
           <a:p>
-            <a:r>
-              <a:rPr lang="en-ZA"/>
-              <a:t>Add a footer</a:t>
-            </a:r>
-            <a:endParaRPr lang="en-ZA" dirty="0"/>
-          </a:p>
-        </p:txBody>
-      </p:sp>
-      <p:sp>
-        <p:nvSpPr>
-          <p:cNvPr id="5" name="Title 4">
-            <a:extLst>
-              <a:ext uri="{FF2B5EF4-FFF2-40B4-BE49-F238E27FC236}">
-                <a16:creationId xmlns:a16="http://schemas.microsoft.com/office/drawing/2014/main" id="{76A3CA81-7A6C-47BC-8D67-926B325F8336}"/>
-              </a:ext>
-            </a:extLst>
-          </p:cNvPr>
-          <p:cNvSpPr>
-            <a:spLocks noGrp="1"/>
-          </p:cNvSpPr>
-          <p:nvPr>
-            <p:ph type="title"/>
-          </p:nvPr>
-        </p:nvSpPr>
-        <p:spPr/>
-        <p:txBody>
-          <a:bodyPr/>
-          <a:lstStyle/>
-          <a:p>
-            <a:r>
-              <a:rPr lang="en-US" dirty="0"/>
-              <a:t>Population</a:t>
+            <a:pPr lvl="1"/>
+            <a:r>
+              <a:rPr lang="en-US" sz="2400" dirty="0"/>
+              <a:t>Google Maps API</a:t>
             </a:r>
           </a:p>
         </p:txBody>
@@ -22562,7 +23697,7 @@
     </p:spTree>
     <p:extLst>
       <p:ext uri="{BB962C8B-B14F-4D97-AF65-F5344CB8AC3E}">
-        <p14:creationId xmlns:p14="http://schemas.microsoft.com/office/powerpoint/2010/main" val="2218590013"/>
+        <p14:creationId xmlns:p14="http://schemas.microsoft.com/office/powerpoint/2010/main" val="1067008547"/>
       </p:ext>
     </p:extLst>
   </p:cSld>
@@ -22605,12 +23740,84 @@
             <p:ph idx="1"/>
           </p:nvPr>
         </p:nvSpPr>
-        <p:spPr/>
+        <p:spPr>
+          <a:xfrm>
+            <a:off x="424370" y="1272208"/>
+            <a:ext cx="7405180" cy="4660183"/>
+          </a:xfrm>
+        </p:spPr>
         <p:txBody>
           <a:bodyPr/>
           <a:lstStyle/>
           <a:p>
-            <a:endParaRPr lang="en-US" dirty="0"/>
+            <a:r>
+              <a:rPr lang="en-US" sz="2000" dirty="0"/>
+              <a:t>API pull from FBI National Incident-Based Reporting System (NIBRS)</a:t>
+            </a:r>
+          </a:p>
+          <a:p>
+            <a:pPr lvl="1"/>
+            <a:r>
+              <a:rPr lang="en-US" sz="2000" dirty="0"/>
+              <a:t>Galveston, TX </a:t>
+            </a:r>
+          </a:p>
+          <a:p>
+            <a:pPr lvl="2"/>
+            <a:r>
+              <a:rPr lang="en-US" sz="2000" dirty="0"/>
+              <a:t>Hurricane Ike </a:t>
+            </a:r>
+          </a:p>
+          <a:p>
+            <a:pPr lvl="1"/>
+            <a:r>
+              <a:rPr lang="en-US" sz="2000" dirty="0"/>
+              <a:t>Louisa County, VA</a:t>
+            </a:r>
+          </a:p>
+          <a:p>
+            <a:pPr lvl="2"/>
+            <a:r>
+              <a:rPr lang="en-US" sz="2000" dirty="0"/>
+              <a:t>East Coast Earthquake in 2011</a:t>
+            </a:r>
+          </a:p>
+          <a:p>
+            <a:r>
+              <a:rPr lang="en-US" sz="2000" dirty="0"/>
+              <a:t>Originally started with 3.64 million lines </a:t>
+            </a:r>
+          </a:p>
+          <a:p>
+            <a:pPr lvl="1"/>
+            <a:r>
+              <a:rPr lang="en-US" sz="2000" dirty="0"/>
+              <a:t>Filtered to 46 K by selecting records reported by specific police station (Galveston and Louisa counties).</a:t>
+            </a:r>
+          </a:p>
+          <a:p>
+            <a:r>
+              <a:rPr lang="en-US" sz="2000" dirty="0"/>
+              <a:t>Findings:</a:t>
+            </a:r>
+          </a:p>
+          <a:p>
+            <a:pPr lvl="1"/>
+            <a:r>
+              <a:rPr lang="en-US" sz="2000" dirty="0"/>
+              <a:t>Galveston crime rate dropped immediately on the date of disaster and stayed below average in the two years post hurricane</a:t>
+            </a:r>
+          </a:p>
+          <a:p>
+            <a:pPr lvl="1"/>
+            <a:r>
+              <a:rPr lang="en-US" sz="2000" dirty="0"/>
+              <a:t>Louisa county crime rate dropped on the date of disaster, however it exceeded the average crime rate for the two years following the earthquake</a:t>
+            </a:r>
+          </a:p>
+          <a:p>
+            <a:endParaRPr lang="en-US" sz="2000" dirty="0"/>
           </a:p>
         </p:txBody>
       </p:sp>
@@ -22696,15 +23903,45 @@
           <a:p>
             <a:r>
               <a:rPr lang="en-US" dirty="0"/>
-              <a:t>Average Household Income</a:t>
-            </a:r>
-          </a:p>
-        </p:txBody>
-      </p:sp>
+              <a:t>Crime</a:t>
+            </a:r>
+          </a:p>
+        </p:txBody>
+      </p:sp>
+      <p:pic>
+        <p:nvPicPr>
+          <p:cNvPr id="6" name="Picture 5">
+            <a:extLst>
+              <a:ext uri="{FF2B5EF4-FFF2-40B4-BE49-F238E27FC236}">
+                <a16:creationId xmlns:a16="http://schemas.microsoft.com/office/drawing/2014/main" id="{FF17869B-501A-4130-8511-509CB67C1D5A}"/>
+              </a:ext>
+            </a:extLst>
+          </p:cNvPr>
+          <p:cNvPicPr>
+            <a:picLocks noChangeAspect="1"/>
+          </p:cNvPicPr>
+          <p:nvPr/>
+        </p:nvPicPr>
+        <p:blipFill>
+          <a:blip r:embed="rId3"/>
+          <a:stretch>
+            <a:fillRect/>
+          </a:stretch>
+        </p:blipFill>
+        <p:spPr>
+          <a:xfrm>
+            <a:off x="8061525" y="1272208"/>
+            <a:ext cx="3143250" cy="2933700"/>
+          </a:xfrm>
+          <a:prstGeom prst="rect">
+            <a:avLst/>
+          </a:prstGeom>
+        </p:spPr>
+      </p:pic>
     </p:spTree>
     <p:extLst>
       <p:ext uri="{BB962C8B-B14F-4D97-AF65-F5344CB8AC3E}">
-        <p14:creationId xmlns:p14="http://schemas.microsoft.com/office/powerpoint/2010/main" val="2594962577"/>
+        <p14:creationId xmlns:p14="http://schemas.microsoft.com/office/powerpoint/2010/main" val="2389633252"/>
       </p:ext>
     </p:extLst>
   </p:cSld>
@@ -22747,30 +23984,17 @@
             <p:ph idx="1"/>
           </p:nvPr>
         </p:nvSpPr>
-        <p:spPr/>
+        <p:spPr>
+          <a:xfrm>
+            <a:off x="424370" y="1272208"/>
+            <a:ext cx="7405180" cy="4660183"/>
+          </a:xfrm>
+        </p:spPr>
         <p:txBody>
           <a:bodyPr/>
           <a:lstStyle/>
           <a:p>
-            <a:r>
-              <a:rPr lang="en-US" dirty="0"/>
-              <a:t>Crime</a:t>
-            </a:r>
-          </a:p>
-          <a:p>
-            <a:r>
-              <a:rPr lang="en-US" dirty="0"/>
-              <a:t>Population</a:t>
-            </a:r>
-          </a:p>
-          <a:p>
-            <a:r>
-              <a:rPr lang="en-US" dirty="0"/>
-              <a:t>Median Household Income</a:t>
-            </a:r>
-          </a:p>
-          <a:p>
-            <a:endParaRPr lang="en-US" dirty="0"/>
+            <a:endParaRPr lang="en-US" sz="2000" dirty="0"/>
           </a:p>
         </p:txBody>
       </p:sp>
@@ -22856,15 +24080,45 @@
           <a:p>
             <a:r>
               <a:rPr lang="en-US" dirty="0"/>
-              <a:t>Findings</a:t>
-            </a:r>
-          </a:p>
-        </p:txBody>
-      </p:sp>
+              <a:t>Averages</a:t>
+            </a:r>
+          </a:p>
+        </p:txBody>
+      </p:sp>
+      <p:pic>
+        <p:nvPicPr>
+          <p:cNvPr id="6" name="Picture 5">
+            <a:extLst>
+              <a:ext uri="{FF2B5EF4-FFF2-40B4-BE49-F238E27FC236}">
+                <a16:creationId xmlns:a16="http://schemas.microsoft.com/office/drawing/2014/main" id="{FF17869B-501A-4130-8511-509CB67C1D5A}"/>
+              </a:ext>
+            </a:extLst>
+          </p:cNvPr>
+          <p:cNvPicPr>
+            <a:picLocks noChangeAspect="1"/>
+          </p:cNvPicPr>
+          <p:nvPr/>
+        </p:nvPicPr>
+        <p:blipFill>
+          <a:blip r:embed="rId3"/>
+          <a:stretch>
+            <a:fillRect/>
+          </a:stretch>
+        </p:blipFill>
+        <p:spPr>
+          <a:xfrm>
+            <a:off x="8061525" y="1272208"/>
+            <a:ext cx="3143250" cy="2933700"/>
+          </a:xfrm>
+          <a:prstGeom prst="rect">
+            <a:avLst/>
+          </a:prstGeom>
+        </p:spPr>
+      </p:pic>
     </p:spTree>
     <p:extLst>
       <p:ext uri="{BB962C8B-B14F-4D97-AF65-F5344CB8AC3E}">
-        <p14:creationId xmlns:p14="http://schemas.microsoft.com/office/powerpoint/2010/main" val="3775976197"/>
+        <p14:creationId xmlns:p14="http://schemas.microsoft.com/office/powerpoint/2010/main" val="86234117"/>
       </p:ext>
     </p:extLst>
   </p:cSld>
@@ -22893,185 +24147,84 @@
       </p:grpSpPr>
       <p:sp>
         <p:nvSpPr>
-          <p:cNvPr id="8" name="Text Placeholder 7">
-            <a:extLst>
-              <a:ext uri="{FF2B5EF4-FFF2-40B4-BE49-F238E27FC236}">
-                <a16:creationId xmlns:a16="http://schemas.microsoft.com/office/drawing/2014/main" id="{937AF956-2A90-4422-A3C2-A6109BD133BA}"/>
-              </a:ext>
-            </a:extLst>
-          </p:cNvPr>
-          <p:cNvSpPr>
-            <a:spLocks noGrp="1"/>
-          </p:cNvSpPr>
-          <p:nvPr>
-            <p:ph type="body" sz="quarter" idx="18"/>
-          </p:nvPr>
-        </p:nvSpPr>
-        <p:spPr>
-          <a:xfrm>
-            <a:off x="424800" y="3327399"/>
-            <a:ext cx="5468000" cy="2032001"/>
-          </a:xfrm>
-        </p:spPr>
+          <p:cNvPr id="2" name="Content Placeholder 1">
+            <a:extLst>
+              <a:ext uri="{FF2B5EF4-FFF2-40B4-BE49-F238E27FC236}">
+                <a16:creationId xmlns:a16="http://schemas.microsoft.com/office/drawing/2014/main" id="{73416882-5670-4C40-A366-8D841513824D}"/>
+              </a:ext>
+            </a:extLst>
+          </p:cNvPr>
+          <p:cNvSpPr>
+            <a:spLocks noGrp="1"/>
+          </p:cNvSpPr>
+          <p:nvPr>
+            <p:ph idx="1"/>
+          </p:nvPr>
+        </p:nvSpPr>
+        <p:spPr/>
         <p:txBody>
           <a:bodyPr/>
           <a:lstStyle/>
           <a:p>
             <a:r>
-              <a:rPr lang="en-ZA" dirty="0"/>
-              <a:t>Lorem </a:t>
-            </a:r>
-            <a:r>
-              <a:rPr lang="en-ZA" noProof="1"/>
-              <a:t>ipsum dolor sit amet, consectetur adipiscing elit. Etiam aliquet eu mi quis lacinia. </a:t>
-            </a:r>
-          </a:p>
-          <a:p>
-            <a:r>
-              <a:rPr lang="en-ZA" noProof="1"/>
-              <a:t>Ut fermentum a magna ut eleifend. Integer convallis suscipit ante eu varius. </a:t>
-            </a:r>
-          </a:p>
-          <a:p>
-            <a:r>
-              <a:rPr lang="en-ZA" noProof="1"/>
-              <a:t>Morbi a purus dolor. Suspendisse sit amet ipsum finibus justo viverra blandit. Ut congue quis tortor eget sodales. </a:t>
-            </a:r>
-          </a:p>
-        </p:txBody>
-      </p:sp>
-      <p:sp>
-        <p:nvSpPr>
-          <p:cNvPr id="2" name="Title 1">
-            <a:extLst>
-              <a:ext uri="{FF2B5EF4-FFF2-40B4-BE49-F238E27FC236}">
-                <a16:creationId xmlns:a16="http://schemas.microsoft.com/office/drawing/2014/main" id="{63E41472-323F-47B9-8C9E-D3B43CA30C02}"/>
-              </a:ext>
-            </a:extLst>
-          </p:cNvPr>
-          <p:cNvSpPr>
-            <a:spLocks noGrp="1"/>
-          </p:cNvSpPr>
-          <p:nvPr>
-            <p:ph type="ctrTitle"/>
-          </p:nvPr>
-        </p:nvSpPr>
-        <p:spPr/>
-        <p:txBody>
-          <a:bodyPr/>
-          <a:lstStyle/>
-          <a:p>
-            <a:r>
-              <a:rPr lang="en-ZA" dirty="0"/>
-              <a:t>     Conclusion</a:t>
-            </a:r>
-          </a:p>
-        </p:txBody>
-      </p:sp>
-      <p:pic>
-        <p:nvPicPr>
-          <p:cNvPr id="10" name="Picture Placeholder 9" descr="Image of office building windows">
-            <a:extLst>
-              <a:ext uri="{FF2B5EF4-FFF2-40B4-BE49-F238E27FC236}">
-                <a16:creationId xmlns:a16="http://schemas.microsoft.com/office/drawing/2014/main" id="{9663686B-44B2-425C-9F15-899A0641AA7D}"/>
-              </a:ext>
-            </a:extLst>
-          </p:cNvPr>
-          <p:cNvPicPr>
-            <a:picLocks noGrp="1" noChangeAspect="1"/>
-          </p:cNvPicPr>
-          <p:nvPr>
-            <p:ph type="pic" sz="quarter" idx="16"/>
-          </p:nvPr>
-        </p:nvPicPr>
-        <p:blipFill>
-          <a:blip r:embed="rId2">
-            <a:extLst>
-              <a:ext uri="{28A0092B-C50C-407E-A947-70E740481C1C}">
-                <a14:useLocalDpi xmlns:a14="http://schemas.microsoft.com/office/drawing/2010/main"/>
-              </a:ext>
-            </a:extLst>
-          </a:blip>
-          <a:stretch>
-            <a:fillRect/>
-          </a:stretch>
-        </p:blipFill>
-        <p:spPr>
-          <a:xfrm>
-            <a:off x="7652806" y="764519"/>
-            <a:ext cx="1872000" cy="1872000"/>
-          </a:xfrm>
-        </p:spPr>
-      </p:pic>
-      <p:pic>
-        <p:nvPicPr>
-          <p:cNvPr id="12" name="Picture Placeholder 11" descr="close up image of inside building material">
-            <a:extLst>
-              <a:ext uri="{FF2B5EF4-FFF2-40B4-BE49-F238E27FC236}">
-                <a16:creationId xmlns:a16="http://schemas.microsoft.com/office/drawing/2014/main" id="{C640A70E-BC90-4E9E-97DF-9D7362FEEC64}"/>
-              </a:ext>
-            </a:extLst>
-          </p:cNvPr>
-          <p:cNvPicPr>
-            <a:picLocks noGrp="1" noChangeAspect="1"/>
-          </p:cNvPicPr>
-          <p:nvPr>
-            <p:ph type="pic" sz="quarter" idx="17"/>
-          </p:nvPr>
-        </p:nvPicPr>
-        <p:blipFill>
-          <a:blip r:embed="rId3">
-            <a:extLst>
-              <a:ext uri="{28A0092B-C50C-407E-A947-70E740481C1C}">
-                <a14:useLocalDpi xmlns:a14="http://schemas.microsoft.com/office/drawing/2010/main"/>
-              </a:ext>
-            </a:extLst>
-          </a:blip>
-          <a:stretch>
-            <a:fillRect/>
-          </a:stretch>
-        </p:blipFill>
-        <p:spPr>
-          <a:xfrm>
-            <a:off x="9713594" y="767558"/>
-            <a:ext cx="1872000" cy="1865922"/>
-          </a:xfrm>
-        </p:spPr>
-      </p:pic>
-      <p:sp>
-        <p:nvSpPr>
-          <p:cNvPr id="5" name="Footer Placeholder 4">
-            <a:extLst>
-              <a:ext uri="{FF2B5EF4-FFF2-40B4-BE49-F238E27FC236}">
-                <a16:creationId xmlns:a16="http://schemas.microsoft.com/office/drawing/2014/main" id="{798981C9-C6B7-494A-8742-2D006C95F934}"/>
-              </a:ext>
-            </a:extLst>
-          </p:cNvPr>
-          <p:cNvSpPr>
-            <a:spLocks noGrp="1"/>
-          </p:cNvSpPr>
-          <p:nvPr>
-            <p:ph type="ftr" sz="quarter" idx="12"/>
-          </p:nvPr>
-        </p:nvSpPr>
-        <p:spPr/>
-        <p:txBody>
-          <a:bodyPr/>
-          <a:lstStyle/>
-          <a:p>
-            <a:r>
-              <a:rPr lang="en-ZA" dirty="0"/>
-              <a:t>Add a footer</a:t>
-            </a:r>
-          </a:p>
-        </p:txBody>
-      </p:sp>
-      <p:sp>
-        <p:nvSpPr>
-          <p:cNvPr id="4" name="Slide Number Placeholder 3">
-            <a:extLst>
-              <a:ext uri="{FF2B5EF4-FFF2-40B4-BE49-F238E27FC236}">
-                <a16:creationId xmlns:a16="http://schemas.microsoft.com/office/drawing/2014/main" id="{903F83A2-B38E-4405-A418-8BC7C1D25B8A}"/>
+              <a:rPr lang="en-US" dirty="0"/>
+              <a:t> Where did data come from?</a:t>
+            </a:r>
+          </a:p>
+          <a:p>
+            <a:pPr lvl="1"/>
+            <a:r>
+              <a:rPr lang="en-US" dirty="0"/>
+              <a:t>Both data (population estimate for Galveston city and Louisa county) came from Census Data API.</a:t>
+            </a:r>
+          </a:p>
+          <a:p>
+            <a:r>
+              <a:rPr lang="en-US" dirty="0"/>
+              <a:t>How much start with?</a:t>
+            </a:r>
+          </a:p>
+          <a:p>
+            <a:pPr lvl="1"/>
+            <a:r>
+              <a:rPr lang="en-US" dirty="0"/>
+              <a:t>Pulling Census data was pretty straight forward process with a few issues; thus, we had obtained exactly what we needed. The websites contained information on how to pull exact data and reference to variables. The variables we have gather are: Population estimate, Geographic name, Place based on FIPS codes, Dates, and States.</a:t>
+            </a:r>
+          </a:p>
+          <a:p>
+            <a:r>
+              <a:rPr lang="en-US" dirty="0"/>
+              <a:t>How much removed? Why?</a:t>
+            </a:r>
+          </a:p>
+          <a:p>
+            <a:pPr lvl="1"/>
+            <a:r>
+              <a:rPr lang="en-US" dirty="0"/>
+              <a:t>After further processing the data, we have removed some variables such as State and County because that information was provided in different columns.</a:t>
+            </a:r>
+          </a:p>
+          <a:p>
+            <a:r>
+              <a:rPr lang="en-US" dirty="0"/>
+              <a:t>What is left?</a:t>
+            </a:r>
+          </a:p>
+          <a:p>
+            <a:pPr lvl="1"/>
+            <a:r>
+              <a:rPr lang="en-US" dirty="0"/>
+              <a:t>We have left the only columns we needed to graph our plots such as Population, County/City, State, and Year.</a:t>
+            </a:r>
+          </a:p>
+        </p:txBody>
+      </p:sp>
+      <p:sp>
+        <p:nvSpPr>
+          <p:cNvPr id="3" name="Slide Number Placeholder 2">
+            <a:extLst>
+              <a:ext uri="{FF2B5EF4-FFF2-40B4-BE49-F238E27FC236}">
+                <a16:creationId xmlns:a16="http://schemas.microsoft.com/office/drawing/2014/main" id="{E6E438A9-7A49-4873-87AA-B00C0DE2FD1C}"/>
               </a:ext>
             </a:extLst>
           </p:cNvPr>
@@ -23096,10 +24249,67 @@
           </a:p>
         </p:txBody>
       </p:sp>
+      <p:sp>
+        <p:nvSpPr>
+          <p:cNvPr id="4" name="Footer Placeholder 3">
+            <a:extLst>
+              <a:ext uri="{FF2B5EF4-FFF2-40B4-BE49-F238E27FC236}">
+                <a16:creationId xmlns:a16="http://schemas.microsoft.com/office/drawing/2014/main" id="{50D6945F-BD17-45B9-989C-DD613DFA6427}"/>
+              </a:ext>
+            </a:extLst>
+          </p:cNvPr>
+          <p:cNvSpPr>
+            <a:spLocks noGrp="1"/>
+          </p:cNvSpPr>
+          <p:nvPr>
+            <p:ph type="ftr" sz="quarter" idx="12"/>
+          </p:nvPr>
+        </p:nvSpPr>
+        <p:spPr/>
+        <p:txBody>
+          <a:bodyPr/>
+          <a:lstStyle/>
+          <a:p>
+            <a:r>
+              <a:rPr lang="en-ZA"/>
+              <a:t>Add a footer</a:t>
+            </a:r>
+            <a:endParaRPr lang="en-ZA" dirty="0"/>
+          </a:p>
+        </p:txBody>
+      </p:sp>
+      <p:sp>
+        <p:nvSpPr>
+          <p:cNvPr id="5" name="Title 4">
+            <a:extLst>
+              <a:ext uri="{FF2B5EF4-FFF2-40B4-BE49-F238E27FC236}">
+                <a16:creationId xmlns:a16="http://schemas.microsoft.com/office/drawing/2014/main" id="{76A3CA81-7A6C-47BC-8D67-926B325F8336}"/>
+              </a:ext>
+            </a:extLst>
+          </p:cNvPr>
+          <p:cNvSpPr>
+            <a:spLocks noGrp="1"/>
+          </p:cNvSpPr>
+          <p:nvPr>
+            <p:ph type="title"/>
+          </p:nvPr>
+        </p:nvSpPr>
+        <p:spPr/>
+        <p:txBody>
+          <a:bodyPr/>
+          <a:lstStyle/>
+          <a:p>
+            <a:r>
+              <a:rPr lang="en-US" dirty="0"/>
+              <a:t>Population</a:t>
+            </a:r>
+          </a:p>
+        </p:txBody>
+      </p:sp>
     </p:spTree>
     <p:extLst>
       <p:ext uri="{BB962C8B-B14F-4D97-AF65-F5344CB8AC3E}">
-        <p14:creationId xmlns:p14="http://schemas.microsoft.com/office/powerpoint/2010/main" val="3515958340"/>
+        <p14:creationId xmlns:p14="http://schemas.microsoft.com/office/powerpoint/2010/main" val="2218590013"/>
       </p:ext>
     </p:extLst>
   </p:cSld>
@@ -23112,14 +24322,6 @@
 <file path=ppt/slides/slide9.xml><?xml version="1.0" encoding="utf-8"?>
 <p:sld xmlns:a="http://schemas.openxmlformats.org/drawingml/2006/main" xmlns:r="http://schemas.openxmlformats.org/officeDocument/2006/relationships" xmlns:p="http://schemas.openxmlformats.org/presentationml/2006/main">
   <p:cSld>
-    <p:bg>
-      <p:bgPr>
-        <a:solidFill>
-          <a:schemeClr val="bg1"/>
-        </a:solidFill>
-        <a:effectLst/>
-      </p:bgPr>
-    </p:bg>
     <p:spTree>
       <p:nvGrpSpPr>
         <p:cNvPr id="1" name=""/>
@@ -23136,284 +24338,156 @@
       </p:grpSpPr>
       <p:sp>
         <p:nvSpPr>
-          <p:cNvPr id="17" name="Rectangle 16">
-            <a:extLst>
-              <a:ext uri="{FF2B5EF4-FFF2-40B4-BE49-F238E27FC236}">
-                <a16:creationId xmlns:a16="http://schemas.microsoft.com/office/drawing/2014/main" id="{B9FF99BD-075F-4761-A995-6FC574BD25EA}"/>
-              </a:ext>
-              <a:ext uri="{C183D7F6-B498-43B3-948B-1728B52AA6E4}">
-                <adec:decorative xmlns:adec="http://schemas.microsoft.com/office/drawing/2017/decorative" val="1"/>
-              </a:ext>
-            </a:extLst>
-          </p:cNvPr>
-          <p:cNvSpPr>
-            <a:spLocks noGrp="1" noRot="1" noChangeAspect="1" noMove="1" noResize="1" noEditPoints="1" noAdjustHandles="1" noChangeArrowheads="1" noChangeShapeType="1" noTextEdit="1"/>
-          </p:cNvSpPr>
-          <p:nvPr>
-            <p:extLst>
-              <p:ext uri="{386F3935-93C4-4BCD-93E2-E3B085C9AB24}">
-                <p16:designElem xmlns:p16="http://schemas.microsoft.com/office/powerpoint/2015/main" val="1"/>
-              </p:ext>
-            </p:extLst>
-          </p:nvPr>
-        </p:nvSpPr>
-        <p:spPr>
-          <a:xfrm>
-            <a:off x="0" y="0"/>
-            <a:ext cx="12192000" cy="6858000"/>
-          </a:xfrm>
-          <a:prstGeom prst="rect">
-            <a:avLst/>
-          </a:prstGeom>
-          <a:solidFill>
-            <a:schemeClr val="bg1">
-              <a:lumMod val="65000"/>
-            </a:schemeClr>
-          </a:solidFill>
-          <a:ln>
-            <a:noFill/>
-          </a:ln>
-        </p:spPr>
-        <p:style>
-          <a:lnRef idx="2">
-            <a:schemeClr val="accent1">
-              <a:shade val="50000"/>
-            </a:schemeClr>
-          </a:lnRef>
-          <a:fillRef idx="1">
-            <a:schemeClr val="accent1"/>
-          </a:fillRef>
-          <a:effectRef idx="0">
-            <a:schemeClr val="accent1"/>
-          </a:effectRef>
-          <a:fontRef idx="minor">
-            <a:schemeClr val="lt1"/>
-          </a:fontRef>
-        </p:style>
-        <p:txBody>
-          <a:bodyPr rtlCol="0" anchor="ctr"/>
+          <p:cNvPr id="2" name="Content Placeholder 1">
+            <a:extLst>
+              <a:ext uri="{FF2B5EF4-FFF2-40B4-BE49-F238E27FC236}">
+                <a16:creationId xmlns:a16="http://schemas.microsoft.com/office/drawing/2014/main" id="{73416882-5670-4C40-A366-8D841513824D}"/>
+              </a:ext>
+            </a:extLst>
+          </p:cNvPr>
+          <p:cNvSpPr>
+            <a:spLocks noGrp="1"/>
+          </p:cNvSpPr>
+          <p:nvPr>
+            <p:ph idx="1"/>
+          </p:nvPr>
+        </p:nvSpPr>
+        <p:spPr/>
+        <p:txBody>
+          <a:bodyPr/>
           <a:lstStyle/>
           <a:p>
-            <a:pPr algn="ctr"/>
-            <a:endParaRPr lang="en-US"/>
-          </a:p>
-        </p:txBody>
-      </p:sp>
-      <p:sp>
-        <p:nvSpPr>
-          <p:cNvPr id="19" name="Rectangle 18">
-            <a:extLst>
-              <a:ext uri="{FF2B5EF4-FFF2-40B4-BE49-F238E27FC236}">
-                <a16:creationId xmlns:a16="http://schemas.microsoft.com/office/drawing/2014/main" id="{A7B21A54-9BA3-4EA9-B460-5A829ADD9051}"/>
-              </a:ext>
-              <a:ext uri="{C183D7F6-B498-43B3-948B-1728B52AA6E4}">
-                <adec:decorative xmlns:adec="http://schemas.microsoft.com/office/drawing/2017/decorative" val="1"/>
-              </a:ext>
-            </a:extLst>
-          </p:cNvPr>
-          <p:cNvSpPr>
-            <a:spLocks noGrp="1" noRot="1" noChangeAspect="1" noMove="1" noResize="1" noEditPoints="1" noAdjustHandles="1" noChangeArrowheads="1" noChangeShapeType="1" noTextEdit="1"/>
-          </p:cNvSpPr>
-          <p:nvPr>
-            <p:extLst>
-              <p:ext uri="{386F3935-93C4-4BCD-93E2-E3B085C9AB24}">
-                <p16:designElem xmlns:p16="http://schemas.microsoft.com/office/powerpoint/2015/main" val="1"/>
-              </p:ext>
-            </p:extLst>
-          </p:nvPr>
-        </p:nvSpPr>
-        <p:spPr>
-          <a:xfrm>
-            <a:off x="477012" y="480060"/>
-            <a:ext cx="11237976" cy="5897880"/>
-          </a:xfrm>
-          <a:prstGeom prst="rect">
-            <a:avLst/>
-          </a:prstGeom>
-          <a:noFill/>
-          <a:ln>
-            <a:solidFill>
-              <a:schemeClr val="bg1"/>
-            </a:solidFill>
-          </a:ln>
-        </p:spPr>
-        <p:style>
-          <a:lnRef idx="2">
-            <a:schemeClr val="accent1">
-              <a:shade val="50000"/>
-            </a:schemeClr>
-          </a:lnRef>
-          <a:fillRef idx="1">
-            <a:schemeClr val="accent1"/>
-          </a:fillRef>
-          <a:effectRef idx="0">
-            <a:schemeClr val="accent1"/>
-          </a:effectRef>
-          <a:fontRef idx="minor">
-            <a:schemeClr val="lt1"/>
-          </a:fontRef>
-        </p:style>
-        <p:txBody>
-          <a:bodyPr rtlCol="0" anchor="ctr"/>
+            <a:r>
+              <a:rPr lang="en-US" dirty="0"/>
+              <a:t>Where Did The Data Come From?</a:t>
+            </a:r>
+          </a:p>
+          <a:p>
+            <a:pPr lvl="1"/>
+            <a:r>
+              <a:rPr lang="en-US" dirty="0"/>
+              <a:t>The data for the median household income (Louisa County, VA and Galveston, TX) were obtained through the Census data website using an API key.</a:t>
+            </a:r>
+          </a:p>
+          <a:p>
+            <a:r>
+              <a:rPr lang="en-US" dirty="0"/>
+              <a:t>2. How much data to start with?</a:t>
+            </a:r>
+          </a:p>
+          <a:p>
+            <a:pPr lvl="1"/>
+            <a:r>
+              <a:rPr lang="en-US" dirty="0"/>
+              <a:t>I was able to access data on the county, state, dates, median household income, median household income margins of error.</a:t>
+            </a:r>
+          </a:p>
+          <a:p>
+            <a:r>
+              <a:rPr lang="en-US" dirty="0"/>
+              <a:t>3.How much was removed, and how much is left?</a:t>
+            </a:r>
+          </a:p>
+          <a:p>
+            <a:pPr lvl="1"/>
+            <a:r>
+              <a:rPr lang="en-US" dirty="0"/>
+              <a:t>I removed State and County data as that was already located on the chart, leaving only the incomes, dates, and location.</a:t>
+            </a:r>
+          </a:p>
+        </p:txBody>
+      </p:sp>
+      <p:sp>
+        <p:nvSpPr>
+          <p:cNvPr id="3" name="Slide Number Placeholder 2">
+            <a:extLst>
+              <a:ext uri="{FF2B5EF4-FFF2-40B4-BE49-F238E27FC236}">
+                <a16:creationId xmlns:a16="http://schemas.microsoft.com/office/drawing/2014/main" id="{E6E438A9-7A49-4873-87AA-B00C0DE2FD1C}"/>
+              </a:ext>
+            </a:extLst>
+          </p:cNvPr>
+          <p:cNvSpPr>
+            <a:spLocks noGrp="1"/>
+          </p:cNvSpPr>
+          <p:nvPr>
+            <p:ph type="sldNum" sz="quarter" idx="11"/>
+          </p:nvPr>
+        </p:nvSpPr>
+        <p:spPr/>
+        <p:txBody>
+          <a:bodyPr/>
           <a:lstStyle/>
           <a:p>
-            <a:pPr algn="ctr"/>
-            <a:endParaRPr lang="en-US"/>
-          </a:p>
-        </p:txBody>
-      </p:sp>
-      <p:sp>
-        <p:nvSpPr>
-          <p:cNvPr id="21" name="Rectangle 20">
-            <a:extLst>
-              <a:ext uri="{FF2B5EF4-FFF2-40B4-BE49-F238E27FC236}">
-                <a16:creationId xmlns:a16="http://schemas.microsoft.com/office/drawing/2014/main" id="{6FA8F714-B9D8-488A-8CCA-E9948FF913A9}"/>
-              </a:ext>
-              <a:ext uri="{C183D7F6-B498-43B3-948B-1728B52AA6E4}">
-                <adec:decorative xmlns:adec="http://schemas.microsoft.com/office/drawing/2017/decorative" val="1"/>
-              </a:ext>
-            </a:extLst>
-          </p:cNvPr>
-          <p:cNvSpPr>
-            <a:spLocks noGrp="1" noRot="1" noChangeAspect="1" noMove="1" noResize="1" noEditPoints="1" noAdjustHandles="1" noChangeArrowheads="1" noChangeShapeType="1" noTextEdit="1"/>
-          </p:cNvSpPr>
-          <p:nvPr>
-            <p:extLst>
-              <p:ext uri="{386F3935-93C4-4BCD-93E2-E3B085C9AB24}">
-                <p16:designElem xmlns:p16="http://schemas.microsoft.com/office/powerpoint/2015/main" val="1"/>
-              </p:ext>
-            </p:extLst>
-          </p:nvPr>
-        </p:nvSpPr>
-        <p:spPr>
-          <a:xfrm>
-            <a:off x="643466" y="643468"/>
-            <a:ext cx="10905067" cy="5571066"/>
-          </a:xfrm>
-          <a:prstGeom prst="rect">
-            <a:avLst/>
-          </a:prstGeom>
-          <a:solidFill>
-            <a:srgbClr val="FFFFFF"/>
-          </a:solidFill>
-          <a:ln>
-            <a:noFill/>
-          </a:ln>
-        </p:spPr>
-        <p:style>
-          <a:lnRef idx="2">
-            <a:schemeClr val="accent1">
-              <a:shade val="50000"/>
-            </a:schemeClr>
-          </a:lnRef>
-          <a:fillRef idx="1">
-            <a:schemeClr val="accent1"/>
-          </a:fillRef>
-          <a:effectRef idx="0">
-            <a:schemeClr val="accent1"/>
-          </a:effectRef>
-          <a:fontRef idx="minor">
-            <a:schemeClr val="lt1"/>
-          </a:fontRef>
-        </p:style>
-        <p:txBody>
-          <a:bodyPr rtlCol="0" anchor="ctr"/>
-          <a:lstStyle/>
-          <a:p>
-            <a:pPr algn="ctr"/>
-            <a:endParaRPr lang="en-US"/>
-          </a:p>
-        </p:txBody>
-      </p:sp>
-      <p:pic>
-        <p:nvPicPr>
-          <p:cNvPr id="5" name="Picture 4" descr="A picture containing clipart&#10;&#10;Description automatically generated">
-            <a:extLst>
-              <a:ext uri="{FF2B5EF4-FFF2-40B4-BE49-F238E27FC236}">
-                <a16:creationId xmlns:a16="http://schemas.microsoft.com/office/drawing/2014/main" id="{3FBD1A20-F02E-1B48-81EE-F8EF452B3DAD}"/>
-              </a:ext>
-            </a:extLst>
-          </p:cNvPr>
-          <p:cNvPicPr>
-            <a:picLocks noChangeAspect="1"/>
-          </p:cNvPicPr>
-          <p:nvPr/>
-        </p:nvPicPr>
-        <p:blipFill rotWithShape="1">
-          <a:blip r:embed="rId2"/>
-          <a:srcRect t="2759" b="7740"/>
-          <a:stretch/>
-        </p:blipFill>
-        <p:spPr>
-          <a:xfrm>
-            <a:off x="2666017" y="1123527"/>
-            <a:ext cx="6859961" cy="4604800"/>
-          </a:xfrm>
-          <a:prstGeom prst="rect">
-            <a:avLst/>
-          </a:prstGeom>
-        </p:spPr>
-      </p:pic>
-      <p:sp>
-        <p:nvSpPr>
-          <p:cNvPr id="2" name="Slide Number Placeholder 1">
-            <a:extLst>
-              <a:ext uri="{FF2B5EF4-FFF2-40B4-BE49-F238E27FC236}">
-                <a16:creationId xmlns:a16="http://schemas.microsoft.com/office/drawing/2014/main" id="{B9E2F80A-DEFA-4FAD-BB22-4236BAEB0495}"/>
-              </a:ext>
-            </a:extLst>
-          </p:cNvPr>
-          <p:cNvSpPr>
-            <a:spLocks noGrp="1"/>
-          </p:cNvSpPr>
-          <p:nvPr>
-            <p:ph type="sldNum" sz="quarter" idx="11"/>
-          </p:nvPr>
-        </p:nvSpPr>
-        <p:spPr>
-          <a:xfrm>
-            <a:off x="8610600" y="6356350"/>
-            <a:ext cx="2743200" cy="365125"/>
-          </a:xfrm>
-        </p:spPr>
-        <p:txBody>
-          <a:bodyPr vert="horz" lIns="91440" tIns="45720" rIns="91440" bIns="45720" rtlCol="0" anchor="ctr">
-            <a:normAutofit/>
-          </a:bodyPr>
-          <a:lstStyle/>
-          <a:p>
-            <a:pPr algn="r">
-              <a:spcAft>
-                <a:spcPts val="600"/>
-              </a:spcAft>
-            </a:pPr>
             <a:fld id="{19B51A1E-902D-48AF-9020-955120F399B6}" type="slidenum">
-              <a:rPr lang="en-US" sz="1200">
-                <a:solidFill>
-                  <a:srgbClr val="FFFFFF"/>
-                </a:solidFill>
-                <a:latin typeface="+mn-lt"/>
-              </a:rPr>
-              <a:pPr algn="r">
-                <a:spcAft>
-                  <a:spcPts val="600"/>
-                </a:spcAft>
-              </a:pPr>
+              <a:rPr lang="en-ZA" smtClean="0"/>
+              <a:pPr/>
               <a:t>9</a:t>
             </a:fld>
-            <a:endParaRPr lang="en-US" sz="1200">
-              <a:solidFill>
-                <a:srgbClr val="FFFFFF"/>
-              </a:solidFill>
-              <a:latin typeface="+mn-lt"/>
-            </a:endParaRPr>
+            <a:endParaRPr lang="en-ZA" dirty="0"/>
+          </a:p>
+        </p:txBody>
+      </p:sp>
+      <p:sp>
+        <p:nvSpPr>
+          <p:cNvPr id="4" name="Footer Placeholder 3">
+            <a:extLst>
+              <a:ext uri="{FF2B5EF4-FFF2-40B4-BE49-F238E27FC236}">
+                <a16:creationId xmlns:a16="http://schemas.microsoft.com/office/drawing/2014/main" id="{50D6945F-BD17-45B9-989C-DD613DFA6427}"/>
+              </a:ext>
+            </a:extLst>
+          </p:cNvPr>
+          <p:cNvSpPr>
+            <a:spLocks noGrp="1"/>
+          </p:cNvSpPr>
+          <p:nvPr>
+            <p:ph type="ftr" sz="quarter" idx="12"/>
+          </p:nvPr>
+        </p:nvSpPr>
+        <p:spPr/>
+        <p:txBody>
+          <a:bodyPr/>
+          <a:lstStyle/>
+          <a:p>
+            <a:r>
+              <a:rPr lang="en-ZA"/>
+              <a:t>Add a footer</a:t>
+            </a:r>
+            <a:endParaRPr lang="en-ZA" dirty="0"/>
+          </a:p>
+        </p:txBody>
+      </p:sp>
+      <p:sp>
+        <p:nvSpPr>
+          <p:cNvPr id="5" name="Title 4">
+            <a:extLst>
+              <a:ext uri="{FF2B5EF4-FFF2-40B4-BE49-F238E27FC236}">
+                <a16:creationId xmlns:a16="http://schemas.microsoft.com/office/drawing/2014/main" id="{76A3CA81-7A6C-47BC-8D67-926B325F8336}"/>
+              </a:ext>
+            </a:extLst>
+          </p:cNvPr>
+          <p:cNvSpPr>
+            <a:spLocks noGrp="1"/>
+          </p:cNvSpPr>
+          <p:nvPr>
+            <p:ph type="title"/>
+          </p:nvPr>
+        </p:nvSpPr>
+        <p:spPr/>
+        <p:txBody>
+          <a:bodyPr/>
+          <a:lstStyle/>
+          <a:p>
+            <a:r>
+              <a:rPr lang="en-US" dirty="0"/>
+              <a:t>Median Household Income</a:t>
+            </a:r>
           </a:p>
         </p:txBody>
       </p:sp>
     </p:spTree>
     <p:extLst>
       <p:ext uri="{BB962C8B-B14F-4D97-AF65-F5344CB8AC3E}">
-        <p14:creationId xmlns:p14="http://schemas.microsoft.com/office/powerpoint/2010/main" val="59582380"/>
+        <p14:creationId xmlns:p14="http://schemas.microsoft.com/office/powerpoint/2010/main" val="2594962577"/>
       </p:ext>
     </p:extLst>
   </p:cSld>

</xml_diff>